<commit_message>
Change primitive type declarations with alyas types
</commit_message>
<xml_diff>
--- a/Elegant_Objects.pptx
+++ b/Elegant_Objects.pptx
@@ -3456,14 +3456,14 @@
             <p:ph idx="1"/>
             <p:extLst>
               <p:ext uri="{D42A27DB-BD31-4B8C-83A1-F6EECF244321}">
-                <p14:modId xmlns:p14="http://schemas.microsoft.com/office/powerpoint/2010/main" val="4271920885"/>
+                <p14:modId xmlns:p14="http://schemas.microsoft.com/office/powerpoint/2010/main" val="2852566320"/>
               </p:ext>
             </p:extLst>
           </p:nvPr>
         </p:nvGraphicFramePr>
         <p:xfrm>
           <a:off x="838200" y="1825625"/>
-          <a:ext cx="10515597" cy="3032760"/>
+          <a:ext cx="10515597" cy="3688080"/>
         </p:xfrm>
         <a:graphic>
           <a:graphicData uri="http://schemas.openxmlformats.org/drawingml/2006/table">
@@ -3749,7 +3749,7 @@
                     <a:p>
                       <a:r>
                         <a:rPr lang="fr-FR" b="1" dirty="0"/>
-                        <a:t>Variables locales / champs privés</a:t>
+                        <a:t>Variables locales / Paramètres</a:t>
                       </a:r>
                       <a:endParaRPr lang="fr-FR" dirty="0"/>
                     </a:p>
@@ -3762,8 +3762,20 @@
                     <a:lstStyle/>
                     <a:p>
                       <a:r>
-                        <a:rPr lang="fr-FR"/>
-                        <a:t>camelCase (ex : title)</a:t>
+                        <a:rPr lang="fr-FR" dirty="0" err="1"/>
+                        <a:t>camelCase</a:t>
+                      </a:r>
+                      <a:r>
+                        <a:rPr lang="fr-FR" dirty="0"/>
+                        <a:t> (ex : </a:t>
+                      </a:r>
+                      <a:r>
+                        <a:rPr lang="fr-FR" dirty="0" err="1"/>
+                        <a:t>title</a:t>
+                      </a:r>
+                      <a:r>
+                        <a:rPr lang="fr-FR" dirty="0"/>
+                        <a:t>)</a:t>
                       </a:r>
                     </a:p>
                   </a:txBody>
@@ -3780,7 +3792,7 @@
                       </a:r>
                       <a:r>
                         <a:rPr lang="fr-FR" dirty="0"/>
-                        <a:t>, souvent préfixé par _ pour champs privés (_</a:t>
+                        <a:t> (ex : </a:t>
                       </a:r>
                       <a:r>
                         <a:rPr lang="fr-FR" dirty="0" err="1"/>
@@ -3808,7 +3820,7 @@
                     <a:p>
                       <a:r>
                         <a:rPr lang="fr-FR" b="1" dirty="0"/>
-                        <a:t>Constantes</a:t>
+                        <a:t>Champs privés</a:t>
                       </a:r>
                       <a:endParaRPr lang="fr-FR" dirty="0"/>
                     </a:p>
@@ -3820,11 +3832,169 @@
                     <a:bodyPr/>
                     <a:lstStyle/>
                     <a:p>
-                      <a:r>
-                        <a:rPr lang="en-US" dirty="0"/>
+                      <a:pPr marL="0" marR="0" lvl="0" indent="0" algn="l" defTabSz="914400" rtl="0" eaLnBrk="1" fontAlgn="auto" latinLnBrk="0" hangingPunct="1">
+                        <a:lnSpc>
+                          <a:spcPct val="100000"/>
+                        </a:lnSpc>
+                        <a:spcBef>
+                          <a:spcPts val="0"/>
+                        </a:spcBef>
+                        <a:spcAft>
+                          <a:spcPts val="0"/>
+                        </a:spcAft>
+                        <a:buClrTx/>
+                        <a:buSzTx/>
+                        <a:buFontTx/>
+                        <a:buNone/>
+                        <a:tabLst/>
+                        <a:defRPr/>
+                      </a:pPr>
+                      <a:r>
+                        <a:rPr lang="fr-FR" dirty="0" err="1"/>
+                        <a:t>camelCase</a:t>
+                      </a:r>
+                      <a:r>
+                        <a:rPr lang="fr-FR" dirty="0"/>
+                        <a:t> (ex : </a:t>
+                      </a:r>
+                      <a:r>
+                        <a:rPr lang="fr-FR" dirty="0" err="1"/>
+                        <a:t>title</a:t>
+                      </a:r>
+                      <a:r>
+                        <a:rPr lang="fr-FR" dirty="0"/>
+                        <a:t>)</a:t>
+                      </a:r>
+                    </a:p>
+                  </a:txBody>
+                  <a:tcPr anchor="ctr"/>
+                </a:tc>
+                <a:tc>
+                  <a:txBody>
+                    <a:bodyPr/>
+                    <a:lstStyle/>
+                    <a:p>
+                      <a:r>
+                        <a:rPr lang="fr-FR" dirty="0" err="1"/>
+                        <a:t>camelCase</a:t>
+                      </a:r>
+                      <a:r>
+                        <a:rPr lang="fr-FR" dirty="0"/>
+                        <a:t> préfixé par _ (ex : _</a:t>
+                      </a:r>
+                      <a:r>
+                        <a:rPr lang="fr-FR" dirty="0" err="1"/>
+                        <a:t>title</a:t>
+                      </a:r>
+                      <a:r>
+                        <a:rPr lang="fr-FR" dirty="0"/>
+                        <a:t>)</a:t>
+                      </a:r>
+                    </a:p>
+                  </a:txBody>
+                  <a:tcPr anchor="ctr"/>
+                </a:tc>
+                <a:extLst>
+                  <a:ext uri="{0D108BD9-81ED-4DB2-BD59-A6C34878D82A}">
+                    <a16:rowId xmlns:a16="http://schemas.microsoft.com/office/drawing/2014/main" val="3206605051"/>
+                  </a:ext>
+                </a:extLst>
+              </a:tr>
+              <a:tr h="370840">
+                <a:tc>
+                  <a:txBody>
+                    <a:bodyPr/>
+                    <a:lstStyle/>
+                    <a:p>
+                      <a:r>
+                        <a:rPr lang="fr-FR" sz="1800" b="1" kern="1200" dirty="0">
+                          <a:solidFill>
+                            <a:schemeClr val="dk1"/>
+                          </a:solidFill>
+                          <a:latin typeface="+mn-lt"/>
+                          <a:ea typeface="+mn-ea"/>
+                          <a:cs typeface="+mn-cs"/>
+                        </a:rPr>
+                        <a:t>Types primitifs</a:t>
+                      </a:r>
+                    </a:p>
+                  </a:txBody>
+                  <a:tcPr anchor="ctr"/>
+                </a:tc>
+                <a:tc>
+                  <a:txBody>
+                    <a:bodyPr/>
+                    <a:lstStyle/>
+                    <a:p>
+                      <a:pPr marL="0" marR="0" lvl="0" indent="0" algn="l" defTabSz="914400" rtl="0" eaLnBrk="1" fontAlgn="auto" latinLnBrk="0" hangingPunct="1">
+                        <a:lnSpc>
+                          <a:spcPct val="100000"/>
+                        </a:lnSpc>
+                        <a:spcBef>
+                          <a:spcPts val="0"/>
+                        </a:spcBef>
+                        <a:spcAft>
+                          <a:spcPts val="0"/>
+                        </a:spcAft>
+                        <a:buClrTx/>
+                        <a:buSzTx/>
+                        <a:buFontTx/>
+                        <a:buNone/>
+                        <a:tabLst/>
+                        <a:defRPr/>
+                      </a:pPr>
+                      <a:r>
+                        <a:rPr lang="fr-FR" dirty="0"/>
+                        <a:t>--</a:t>
+                      </a:r>
+                    </a:p>
+                  </a:txBody>
+                  <a:tcPr anchor="ctr"/>
+                </a:tc>
+                <a:tc>
+                  <a:txBody>
+                    <a:bodyPr/>
+                    <a:lstStyle/>
+                    <a:p>
+                      <a:r>
+                        <a:rPr lang="fr-FR" sz="1600" dirty="0"/>
+                        <a:t>Utiliser les alias de types (string) pour les déclarations et le type réel (String) pour l’accès aux méthodes statiques</a:t>
+                      </a:r>
+                    </a:p>
+                  </a:txBody>
+                  <a:tcPr anchor="ctr"/>
+                </a:tc>
+                <a:extLst>
+                  <a:ext uri="{0D108BD9-81ED-4DB2-BD59-A6C34878D82A}">
+                    <a16:rowId xmlns:a16="http://schemas.microsoft.com/office/drawing/2014/main" val="507121887"/>
+                  </a:ext>
+                </a:extLst>
+              </a:tr>
+              <a:tr h="370840">
+                <a:tc>
+                  <a:txBody>
+                    <a:bodyPr/>
+                    <a:lstStyle/>
+                    <a:p>
+                      <a:r>
+                        <a:rPr lang="fr-FR" b="1" dirty="0"/>
+                        <a:t>Constantes</a:t>
+                      </a:r>
+                      <a:endParaRPr lang="fr-FR" dirty="0"/>
+                    </a:p>
+                  </a:txBody>
+                  <a:tcPr anchor="ctr"/>
+                </a:tc>
+                <a:tc>
+                  <a:txBody>
+                    <a:bodyPr/>
+                    <a:lstStyle/>
+                    <a:p>
+                      <a:r>
+                        <a:rPr lang="en-US" sz="1600" dirty="0"/>
                         <a:t>UPPER_SNAKE_CASE (ex : MAX_SIZE)</a:t>
                       </a:r>
-                      <a:endParaRPr lang="fr-FR" dirty="0"/>
+                      <a:endParaRPr lang="fr-FR" sz="1600" dirty="0"/>
                     </a:p>
                   </a:txBody>
                   <a:tcPr/>

</xml_diff>

<commit_message>
Changer the signature of methods that redefine a virtual method
</commit_message>
<xml_diff>
--- a/Elegant_Objects.pptx
+++ b/Elegant_Objects.pptx
@@ -3456,14 +3456,14 @@
             <p:ph idx="1"/>
             <p:extLst>
               <p:ext uri="{D42A27DB-BD31-4B8C-83A1-F6EECF244321}">
-                <p14:modId xmlns:p14="http://schemas.microsoft.com/office/powerpoint/2010/main" val="2852566320"/>
+                <p14:modId xmlns:p14="http://schemas.microsoft.com/office/powerpoint/2010/main" val="1645398581"/>
               </p:ext>
             </p:extLst>
           </p:nvPr>
         </p:nvGraphicFramePr>
         <p:xfrm>
           <a:off x="838200" y="1825625"/>
-          <a:ext cx="10515597" cy="3688080"/>
+          <a:ext cx="10515597" cy="4267200"/>
         </p:xfrm>
         <a:graphic>
           <a:graphicData uri="http://schemas.openxmlformats.org/drawingml/2006/table">
@@ -3967,6 +3967,89 @@
                 <a:extLst>
                   <a:ext uri="{0D108BD9-81ED-4DB2-BD59-A6C34878D82A}">
                     <a16:rowId xmlns:a16="http://schemas.microsoft.com/office/drawing/2014/main" val="507121887"/>
+                  </a:ext>
+                </a:extLst>
+              </a:tr>
+              <a:tr h="370840">
+                <a:tc>
+                  <a:txBody>
+                    <a:bodyPr/>
+                    <a:lstStyle/>
+                    <a:p>
+                      <a:r>
+                        <a:rPr lang="fr-FR" sz="1800" b="1" kern="1200" dirty="0">
+                          <a:solidFill>
+                            <a:schemeClr val="dk1"/>
+                          </a:solidFill>
+                          <a:latin typeface="+mn-lt"/>
+                          <a:ea typeface="+mn-ea"/>
+                          <a:cs typeface="+mn-cs"/>
+                        </a:rPr>
+                        <a:t>Redéfinition de méthodes</a:t>
+                      </a:r>
+                    </a:p>
+                  </a:txBody>
+                  <a:tcPr anchor="ctr"/>
+                </a:tc>
+                <a:tc>
+                  <a:txBody>
+                    <a:bodyPr/>
+                    <a:lstStyle/>
+                    <a:p>
+                      <a:pPr marL="0" marR="0" lvl="0" indent="0" algn="l" defTabSz="914400" rtl="0" eaLnBrk="1" fontAlgn="auto" latinLnBrk="0" hangingPunct="1">
+                        <a:lnSpc>
+                          <a:spcPct val="100000"/>
+                        </a:lnSpc>
+                        <a:spcBef>
+                          <a:spcPts val="0"/>
+                        </a:spcBef>
+                        <a:spcAft>
+                          <a:spcPts val="0"/>
+                        </a:spcAft>
+                        <a:buClrTx/>
+                        <a:buSzTx/>
+                        <a:buFontTx/>
+                        <a:buNone/>
+                        <a:tabLst/>
+                        <a:defRPr/>
+                      </a:pPr>
+                      <a:r>
+                        <a:rPr lang="fr-FR" dirty="0"/>
+                        <a:t>--</a:t>
+                      </a:r>
+                    </a:p>
+                  </a:txBody>
+                  <a:tcPr anchor="ctr"/>
+                </a:tc>
+                <a:tc>
+                  <a:txBody>
+                    <a:bodyPr/>
+                    <a:lstStyle/>
+                    <a:p>
+                      <a:r>
+                        <a:rPr lang="fr-FR" sz="1600" dirty="0"/>
+                        <a:t>Utiliser </a:t>
+                      </a:r>
+                      <a:r>
+                        <a:rPr lang="fr-FR" sz="1600" dirty="0" err="1"/>
+                        <a:t>override</a:t>
+                      </a:r>
+                      <a:r>
+                        <a:rPr lang="fr-FR" sz="1600" dirty="0"/>
+                        <a:t> pour redéfinir une méthode </a:t>
+                      </a:r>
+                      <a:r>
+                        <a:rPr lang="fr-FR" sz="1600" dirty="0" err="1"/>
+                        <a:t>virtual</a:t>
+                      </a:r>
+                      <a:endParaRPr lang="fr-FR" sz="1600" dirty="0"/>
+                    </a:p>
+                  </a:txBody>
+                  <a:tcPr anchor="ctr"/>
+                </a:tc>
+                <a:extLst>
+                  <a:ext uri="{0D108BD9-81ED-4DB2-BD59-A6C34878D82A}">
+                    <a16:rowId xmlns:a16="http://schemas.microsoft.com/office/drawing/2014/main" val="2530530894"/>
                   </a:ext>
                 </a:extLst>
               </a:tr>

</xml_diff>

<commit_message>
Remove nullable on required parameters and set default values
</commit_message>
<xml_diff>
--- a/Elegant_Objects.pptx
+++ b/Elegant_Objects.pptx
@@ -7,6 +7,8 @@
   <p:sldIdLst>
     <p:sldId id="256" r:id="rId2"/>
     <p:sldId id="257" r:id="rId3"/>
+    <p:sldId id="258" r:id="rId4"/>
+    <p:sldId id="259" r:id="rId5"/>
   </p:sldIdLst>
   <p:sldSz cx="12192000" cy="6858000"/>
   <p:notesSz cx="6858000" cy="9144000"/>
@@ -105,6 +107,11 @@
       </a:defRPr>
     </a:lvl9pPr>
   </p:defaultTextStyle>
+  <p:extLst>
+    <p:ext uri="{EFAFB233-063F-42B5-8137-9DF3F51BA10A}">
+      <p15:sldGuideLst xmlns:p15="http://schemas.microsoft.com/office/powerpoint/2012/main"/>
+    </p:ext>
+  </p:extLst>
 </p:presentation>
 </file>
 
@@ -255,7 +262,7 @@
           <a:p>
             <a:fld id="{CF2ECFED-0AE4-4F4D-9F93-28B3B5AEC0C8}" type="datetimeFigureOut">
               <a:rPr lang="fr-FR" smtClean="0"/>
-              <a:t>06/06/2025</a:t>
+              <a:t>09/06/2025</a:t>
             </a:fld>
             <a:endParaRPr lang="fr-FR"/>
           </a:p>
@@ -453,7 +460,7 @@
           <a:p>
             <a:fld id="{CF2ECFED-0AE4-4F4D-9F93-28B3B5AEC0C8}" type="datetimeFigureOut">
               <a:rPr lang="fr-FR" smtClean="0"/>
-              <a:t>06/06/2025</a:t>
+              <a:t>09/06/2025</a:t>
             </a:fld>
             <a:endParaRPr lang="fr-FR"/>
           </a:p>
@@ -661,7 +668,7 @@
           <a:p>
             <a:fld id="{CF2ECFED-0AE4-4F4D-9F93-28B3B5AEC0C8}" type="datetimeFigureOut">
               <a:rPr lang="fr-FR" smtClean="0"/>
-              <a:t>06/06/2025</a:t>
+              <a:t>09/06/2025</a:t>
             </a:fld>
             <a:endParaRPr lang="fr-FR"/>
           </a:p>
@@ -859,7 +866,7 @@
           <a:p>
             <a:fld id="{CF2ECFED-0AE4-4F4D-9F93-28B3B5AEC0C8}" type="datetimeFigureOut">
               <a:rPr lang="fr-FR" smtClean="0"/>
-              <a:t>06/06/2025</a:t>
+              <a:t>09/06/2025</a:t>
             </a:fld>
             <a:endParaRPr lang="fr-FR"/>
           </a:p>
@@ -1134,7 +1141,7 @@
           <a:p>
             <a:fld id="{CF2ECFED-0AE4-4F4D-9F93-28B3B5AEC0C8}" type="datetimeFigureOut">
               <a:rPr lang="fr-FR" smtClean="0"/>
-              <a:t>06/06/2025</a:t>
+              <a:t>09/06/2025</a:t>
             </a:fld>
             <a:endParaRPr lang="fr-FR"/>
           </a:p>
@@ -1399,7 +1406,7 @@
           <a:p>
             <a:fld id="{CF2ECFED-0AE4-4F4D-9F93-28B3B5AEC0C8}" type="datetimeFigureOut">
               <a:rPr lang="fr-FR" smtClean="0"/>
-              <a:t>06/06/2025</a:t>
+              <a:t>09/06/2025</a:t>
             </a:fld>
             <a:endParaRPr lang="fr-FR"/>
           </a:p>
@@ -1811,7 +1818,7 @@
           <a:p>
             <a:fld id="{CF2ECFED-0AE4-4F4D-9F93-28B3B5AEC0C8}" type="datetimeFigureOut">
               <a:rPr lang="fr-FR" smtClean="0"/>
-              <a:t>06/06/2025</a:t>
+              <a:t>09/06/2025</a:t>
             </a:fld>
             <a:endParaRPr lang="fr-FR"/>
           </a:p>
@@ -1952,7 +1959,7 @@
           <a:p>
             <a:fld id="{CF2ECFED-0AE4-4F4D-9F93-28B3B5AEC0C8}" type="datetimeFigureOut">
               <a:rPr lang="fr-FR" smtClean="0"/>
-              <a:t>06/06/2025</a:t>
+              <a:t>09/06/2025</a:t>
             </a:fld>
             <a:endParaRPr lang="fr-FR"/>
           </a:p>
@@ -2065,7 +2072,7 @@
           <a:p>
             <a:fld id="{CF2ECFED-0AE4-4F4D-9F93-28B3B5AEC0C8}" type="datetimeFigureOut">
               <a:rPr lang="fr-FR" smtClean="0"/>
-              <a:t>06/06/2025</a:t>
+              <a:t>09/06/2025</a:t>
             </a:fld>
             <a:endParaRPr lang="fr-FR"/>
           </a:p>
@@ -2376,7 +2383,7 @@
           <a:p>
             <a:fld id="{CF2ECFED-0AE4-4F4D-9F93-28B3B5AEC0C8}" type="datetimeFigureOut">
               <a:rPr lang="fr-FR" smtClean="0"/>
-              <a:t>06/06/2025</a:t>
+              <a:t>09/06/2025</a:t>
             </a:fld>
             <a:endParaRPr lang="fr-FR"/>
           </a:p>
@@ -2664,7 +2671,7 @@
           <a:p>
             <a:fld id="{CF2ECFED-0AE4-4F4D-9F93-28B3B5AEC0C8}" type="datetimeFigureOut">
               <a:rPr lang="fr-FR" smtClean="0"/>
-              <a:t>06/06/2025</a:t>
+              <a:t>09/06/2025</a:t>
             </a:fld>
             <a:endParaRPr lang="fr-FR"/>
           </a:p>
@@ -2905,7 +2912,7 @@
           <a:p>
             <a:fld id="{CF2ECFED-0AE4-4F4D-9F93-28B3B5AEC0C8}" type="datetimeFigureOut">
               <a:rPr lang="fr-FR" smtClean="0"/>
-              <a:t>06/06/2025</a:t>
+              <a:t>09/06/2025</a:t>
             </a:fld>
             <a:endParaRPr lang="fr-FR"/>
           </a:p>
@@ -4169,6 +4176,873 @@
 </p:sld>
 </file>
 
+<file path=ppt/slides/slide3.xml><?xml version="1.0" encoding="utf-8"?>
+<p:sld xmlns:a="http://schemas.openxmlformats.org/drawingml/2006/main" xmlns:r="http://schemas.openxmlformats.org/officeDocument/2006/relationships" xmlns:p="http://schemas.openxmlformats.org/presentationml/2006/main">
+  <p:cSld>
+    <p:spTree>
+      <p:nvGrpSpPr>
+        <p:cNvPr id="1" name=""/>
+        <p:cNvGrpSpPr/>
+        <p:nvPr/>
+      </p:nvGrpSpPr>
+      <p:grpSpPr>
+        <a:xfrm>
+          <a:off x="0" y="0"/>
+          <a:ext cx="0" cy="0"/>
+          <a:chOff x="0" y="0"/>
+          <a:chExt cx="0" cy="0"/>
+        </a:xfrm>
+      </p:grpSpPr>
+      <p:sp>
+        <p:nvSpPr>
+          <p:cNvPr id="2" name="Titre 1">
+            <a:extLst>
+              <a:ext uri="{FF2B5EF4-FFF2-40B4-BE49-F238E27FC236}">
+                <a16:creationId xmlns:a16="http://schemas.microsoft.com/office/drawing/2014/main" id="{52F80228-692A-3134-BE62-73FD1249A1E4}"/>
+              </a:ext>
+            </a:extLst>
+          </p:cNvPr>
+          <p:cNvSpPr>
+            <a:spLocks noGrp="1"/>
+          </p:cNvSpPr>
+          <p:nvPr>
+            <p:ph type="title"/>
+          </p:nvPr>
+        </p:nvSpPr>
+        <p:spPr/>
+        <p:txBody>
+          <a:bodyPr>
+            <a:normAutofit/>
+          </a:bodyPr>
+          <a:lstStyle/>
+          <a:p>
+            <a:r>
+              <a:rPr lang="fr-FR" dirty="0">
+                <a:sym typeface="Wingdings" panose="05000000000000000000" pitchFamily="2" charset="2"/>
+              </a:rPr>
+              <a:t>U</a:t>
+            </a:r>
+            <a:r>
+              <a:rPr lang="fr-FR" dirty="0"/>
+              <a:t>n piège courant en programmation orientée objet </a:t>
+            </a:r>
+            <a:r>
+              <a:rPr lang="fr-FR" dirty="0">
+                <a:sym typeface="Wingdings" panose="05000000000000000000" pitchFamily="2" charset="2"/>
+              </a:rPr>
+              <a:t> NULL</a:t>
+            </a:r>
+            <a:endParaRPr lang="fr-FR" dirty="0"/>
+          </a:p>
+        </p:txBody>
+      </p:sp>
+      <p:sp>
+        <p:nvSpPr>
+          <p:cNvPr id="3" name="Espace réservé du contenu 2">
+            <a:extLst>
+              <a:ext uri="{FF2B5EF4-FFF2-40B4-BE49-F238E27FC236}">
+                <a16:creationId xmlns:a16="http://schemas.microsoft.com/office/drawing/2014/main" id="{71C4436D-DED7-2588-F449-94871305C393}"/>
+              </a:ext>
+            </a:extLst>
+          </p:cNvPr>
+          <p:cNvSpPr>
+            <a:spLocks noGrp="1"/>
+          </p:cNvSpPr>
+          <p:nvPr>
+            <p:ph idx="1"/>
+          </p:nvPr>
+        </p:nvSpPr>
+        <p:spPr>
+          <a:xfrm>
+            <a:off x="314418" y="1998293"/>
+            <a:ext cx="5781582" cy="2249225"/>
+          </a:xfrm>
+        </p:spPr>
+        <p:txBody>
+          <a:bodyPr>
+            <a:normAutofit/>
+          </a:bodyPr>
+          <a:lstStyle/>
+          <a:p>
+            <a:pPr marL="0" indent="0">
+              <a:buNone/>
+            </a:pPr>
+            <a:r>
+              <a:rPr lang="fr-FR" b="1" dirty="0"/>
+              <a:t>Problèmes</a:t>
+            </a:r>
+            <a:r>
+              <a:rPr lang="fr-FR" dirty="0"/>
+              <a:t> </a:t>
+            </a:r>
+          </a:p>
+          <a:p>
+            <a:pPr lvl="1"/>
+            <a:r>
+              <a:rPr lang="fr-FR" dirty="0"/>
+              <a:t>Multiplie les vérifications (</a:t>
+            </a:r>
+            <a:r>
+              <a:rPr lang="fr-FR" dirty="0" err="1"/>
+              <a:t>null</a:t>
+            </a:r>
+            <a:r>
+              <a:rPr lang="fr-FR" dirty="0"/>
+              <a:t> checks)</a:t>
+            </a:r>
+          </a:p>
+          <a:p>
+            <a:pPr lvl="1"/>
+            <a:r>
+              <a:rPr lang="fr-FR" dirty="0"/>
+              <a:t>Provoque des </a:t>
+            </a:r>
+            <a:r>
+              <a:rPr lang="fr-FR" dirty="0" err="1"/>
+              <a:t>NullReferenceException</a:t>
+            </a:r>
+            <a:endParaRPr lang="fr-FR" dirty="0"/>
+          </a:p>
+          <a:p>
+            <a:pPr lvl="1"/>
+            <a:r>
+              <a:rPr lang="fr-FR" dirty="0"/>
+              <a:t>Complexifie le code</a:t>
+            </a:r>
+          </a:p>
+          <a:p>
+            <a:pPr lvl="1"/>
+            <a:r>
+              <a:rPr lang="fr-FR" dirty="0"/>
+              <a:t>Ambiguïté des intentions</a:t>
+            </a:r>
+          </a:p>
+          <a:p>
+            <a:pPr marL="0" indent="0">
+              <a:buNone/>
+            </a:pPr>
+            <a:endParaRPr lang="fr-FR" dirty="0"/>
+          </a:p>
+        </p:txBody>
+      </p:sp>
+      <p:sp>
+        <p:nvSpPr>
+          <p:cNvPr id="7" name="Espace réservé du contenu 2">
+            <a:extLst>
+              <a:ext uri="{FF2B5EF4-FFF2-40B4-BE49-F238E27FC236}">
+                <a16:creationId xmlns:a16="http://schemas.microsoft.com/office/drawing/2014/main" id="{C6F7D569-868E-8E12-16D3-C798F2BFF595}"/>
+              </a:ext>
+            </a:extLst>
+          </p:cNvPr>
+          <p:cNvSpPr txBox="1">
+            <a:spLocks/>
+          </p:cNvSpPr>
+          <p:nvPr/>
+        </p:nvSpPr>
+        <p:spPr>
+          <a:xfrm>
+            <a:off x="4305673" y="4247518"/>
+            <a:ext cx="7412852" cy="1868749"/>
+          </a:xfrm>
+          <a:prstGeom prst="rect">
+            <a:avLst/>
+          </a:prstGeom>
+        </p:spPr>
+        <p:txBody>
+          <a:bodyPr vert="horz" lIns="91440" tIns="45720" rIns="91440" bIns="45720" rtlCol="0">
+            <a:normAutofit/>
+          </a:bodyPr>
+          <a:lstStyle>
+            <a:lvl1pPr marL="228600" indent="-228600" algn="l" defTabSz="914400" rtl="0" eaLnBrk="1" latinLnBrk="0" hangingPunct="1">
+              <a:lnSpc>
+                <a:spcPct val="90000"/>
+              </a:lnSpc>
+              <a:spcBef>
+                <a:spcPts val="1000"/>
+              </a:spcBef>
+              <a:buFont typeface="Arial" panose="020B0604020202020204" pitchFamily="34" charset="0"/>
+              <a:buChar char="•"/>
+              <a:defRPr sz="2800" kern="1200">
+                <a:solidFill>
+                  <a:schemeClr val="tx1"/>
+                </a:solidFill>
+                <a:latin typeface="+mn-lt"/>
+                <a:ea typeface="+mn-ea"/>
+                <a:cs typeface="+mn-cs"/>
+              </a:defRPr>
+            </a:lvl1pPr>
+            <a:lvl2pPr marL="685800" indent="-228600" algn="l" defTabSz="914400" rtl="0" eaLnBrk="1" latinLnBrk="0" hangingPunct="1">
+              <a:lnSpc>
+                <a:spcPct val="90000"/>
+              </a:lnSpc>
+              <a:spcBef>
+                <a:spcPts val="500"/>
+              </a:spcBef>
+              <a:buFont typeface="Arial" panose="020B0604020202020204" pitchFamily="34" charset="0"/>
+              <a:buChar char="•"/>
+              <a:defRPr sz="2400" kern="1200">
+                <a:solidFill>
+                  <a:schemeClr val="tx1"/>
+                </a:solidFill>
+                <a:latin typeface="+mn-lt"/>
+                <a:ea typeface="+mn-ea"/>
+                <a:cs typeface="+mn-cs"/>
+              </a:defRPr>
+            </a:lvl2pPr>
+            <a:lvl3pPr marL="1143000" indent="-228600" algn="l" defTabSz="914400" rtl="0" eaLnBrk="1" latinLnBrk="0" hangingPunct="1">
+              <a:lnSpc>
+                <a:spcPct val="90000"/>
+              </a:lnSpc>
+              <a:spcBef>
+                <a:spcPts val="500"/>
+              </a:spcBef>
+              <a:buFont typeface="Arial" panose="020B0604020202020204" pitchFamily="34" charset="0"/>
+              <a:buChar char="•"/>
+              <a:defRPr sz="2000" kern="1200">
+                <a:solidFill>
+                  <a:schemeClr val="tx1"/>
+                </a:solidFill>
+                <a:latin typeface="+mn-lt"/>
+                <a:ea typeface="+mn-ea"/>
+                <a:cs typeface="+mn-cs"/>
+              </a:defRPr>
+            </a:lvl3pPr>
+            <a:lvl4pPr marL="1600200" indent="-228600" algn="l" defTabSz="914400" rtl="0" eaLnBrk="1" latinLnBrk="0" hangingPunct="1">
+              <a:lnSpc>
+                <a:spcPct val="90000"/>
+              </a:lnSpc>
+              <a:spcBef>
+                <a:spcPts val="500"/>
+              </a:spcBef>
+              <a:buFont typeface="Arial" panose="020B0604020202020204" pitchFamily="34" charset="0"/>
+              <a:buChar char="•"/>
+              <a:defRPr sz="1800" kern="1200">
+                <a:solidFill>
+                  <a:schemeClr val="tx1"/>
+                </a:solidFill>
+                <a:latin typeface="+mn-lt"/>
+                <a:ea typeface="+mn-ea"/>
+                <a:cs typeface="+mn-cs"/>
+              </a:defRPr>
+            </a:lvl4pPr>
+            <a:lvl5pPr marL="2057400" indent="-228600" algn="l" defTabSz="914400" rtl="0" eaLnBrk="1" latinLnBrk="0" hangingPunct="1">
+              <a:lnSpc>
+                <a:spcPct val="90000"/>
+              </a:lnSpc>
+              <a:spcBef>
+                <a:spcPts val="500"/>
+              </a:spcBef>
+              <a:buFont typeface="Arial" panose="020B0604020202020204" pitchFamily="34" charset="0"/>
+              <a:buChar char="•"/>
+              <a:defRPr sz="1800" kern="1200">
+                <a:solidFill>
+                  <a:schemeClr val="tx1"/>
+                </a:solidFill>
+                <a:latin typeface="+mn-lt"/>
+                <a:ea typeface="+mn-ea"/>
+                <a:cs typeface="+mn-cs"/>
+              </a:defRPr>
+            </a:lvl5pPr>
+            <a:lvl6pPr marL="2514600" indent="-228600" algn="l" defTabSz="914400" rtl="0" eaLnBrk="1" latinLnBrk="0" hangingPunct="1">
+              <a:lnSpc>
+                <a:spcPct val="90000"/>
+              </a:lnSpc>
+              <a:spcBef>
+                <a:spcPts val="500"/>
+              </a:spcBef>
+              <a:buFont typeface="Arial" panose="020B0604020202020204" pitchFamily="34" charset="0"/>
+              <a:buChar char="•"/>
+              <a:defRPr sz="1800" kern="1200">
+                <a:solidFill>
+                  <a:schemeClr val="tx1"/>
+                </a:solidFill>
+                <a:latin typeface="+mn-lt"/>
+                <a:ea typeface="+mn-ea"/>
+                <a:cs typeface="+mn-cs"/>
+              </a:defRPr>
+            </a:lvl6pPr>
+            <a:lvl7pPr marL="2971800" indent="-228600" algn="l" defTabSz="914400" rtl="0" eaLnBrk="1" latinLnBrk="0" hangingPunct="1">
+              <a:lnSpc>
+                <a:spcPct val="90000"/>
+              </a:lnSpc>
+              <a:spcBef>
+                <a:spcPts val="500"/>
+              </a:spcBef>
+              <a:buFont typeface="Arial" panose="020B0604020202020204" pitchFamily="34" charset="0"/>
+              <a:buChar char="•"/>
+              <a:defRPr sz="1800" kern="1200">
+                <a:solidFill>
+                  <a:schemeClr val="tx1"/>
+                </a:solidFill>
+                <a:latin typeface="+mn-lt"/>
+                <a:ea typeface="+mn-ea"/>
+                <a:cs typeface="+mn-cs"/>
+              </a:defRPr>
+            </a:lvl7pPr>
+            <a:lvl8pPr marL="3429000" indent="-228600" algn="l" defTabSz="914400" rtl="0" eaLnBrk="1" latinLnBrk="0" hangingPunct="1">
+              <a:lnSpc>
+                <a:spcPct val="90000"/>
+              </a:lnSpc>
+              <a:spcBef>
+                <a:spcPts val="500"/>
+              </a:spcBef>
+              <a:buFont typeface="Arial" panose="020B0604020202020204" pitchFamily="34" charset="0"/>
+              <a:buChar char="•"/>
+              <a:defRPr sz="1800" kern="1200">
+                <a:solidFill>
+                  <a:schemeClr val="tx1"/>
+                </a:solidFill>
+                <a:latin typeface="+mn-lt"/>
+                <a:ea typeface="+mn-ea"/>
+                <a:cs typeface="+mn-cs"/>
+              </a:defRPr>
+            </a:lvl8pPr>
+            <a:lvl9pPr marL="3886200" indent="-228600" algn="l" defTabSz="914400" rtl="0" eaLnBrk="1" latinLnBrk="0" hangingPunct="1">
+              <a:lnSpc>
+                <a:spcPct val="90000"/>
+              </a:lnSpc>
+              <a:spcBef>
+                <a:spcPts val="500"/>
+              </a:spcBef>
+              <a:buFont typeface="Arial" panose="020B0604020202020204" pitchFamily="34" charset="0"/>
+              <a:buChar char="•"/>
+              <a:defRPr sz="1800" kern="1200">
+                <a:solidFill>
+                  <a:schemeClr val="tx1"/>
+                </a:solidFill>
+                <a:latin typeface="+mn-lt"/>
+                <a:ea typeface="+mn-ea"/>
+                <a:cs typeface="+mn-cs"/>
+              </a:defRPr>
+            </a:lvl9pPr>
+          </a:lstStyle>
+          <a:p>
+            <a:pPr marL="0" indent="0">
+              <a:buFont typeface="Arial" panose="020B0604020202020204" pitchFamily="34" charset="0"/>
+              <a:buNone/>
+            </a:pPr>
+            <a:r>
+              <a:rPr lang="fr-FR" b="1" dirty="0"/>
+              <a:t>Règles de conception </a:t>
+            </a:r>
+          </a:p>
+          <a:p>
+            <a:pPr lvl="1"/>
+            <a:r>
+              <a:rPr lang="fr-FR" dirty="0"/>
+              <a:t>Ne pas retourner </a:t>
+            </a:r>
+            <a:r>
+              <a:rPr lang="fr-FR" dirty="0" err="1"/>
+              <a:t>null</a:t>
+            </a:r>
+            <a:endParaRPr lang="fr-FR" dirty="0"/>
+          </a:p>
+          <a:p>
+            <a:pPr lvl="1"/>
+            <a:r>
+              <a:rPr lang="fr-FR" dirty="0"/>
+              <a:t>Ne pas accepter </a:t>
+            </a:r>
+            <a:r>
+              <a:rPr lang="fr-FR" dirty="0" err="1"/>
+              <a:t>null</a:t>
+            </a:r>
+            <a:r>
+              <a:rPr lang="fr-FR" dirty="0"/>
+              <a:t> en paramètre (sauf documenté)</a:t>
+            </a:r>
+          </a:p>
+          <a:p>
+            <a:pPr lvl="1"/>
+            <a:r>
+              <a:rPr lang="fr-FR" dirty="0"/>
+              <a:t>Privilégier des modèles métiers sans </a:t>
+            </a:r>
+            <a:r>
+              <a:rPr lang="fr-FR" dirty="0" err="1"/>
+              <a:t>null</a:t>
+            </a:r>
+            <a:endParaRPr lang="fr-FR" dirty="0"/>
+          </a:p>
+        </p:txBody>
+      </p:sp>
+      <p:sp>
+        <p:nvSpPr>
+          <p:cNvPr id="8" name="Espace réservé du contenu 2">
+            <a:extLst>
+              <a:ext uri="{FF2B5EF4-FFF2-40B4-BE49-F238E27FC236}">
+                <a16:creationId xmlns:a16="http://schemas.microsoft.com/office/drawing/2014/main" id="{87E8E642-4A7C-9D0C-9F7C-F230FF9A6F56}"/>
+              </a:ext>
+            </a:extLst>
+          </p:cNvPr>
+          <p:cNvSpPr txBox="1">
+            <a:spLocks/>
+          </p:cNvSpPr>
+          <p:nvPr/>
+        </p:nvSpPr>
+        <p:spPr>
+          <a:xfrm>
+            <a:off x="6290569" y="1591199"/>
+            <a:ext cx="5427956" cy="2038566"/>
+          </a:xfrm>
+          <a:prstGeom prst="rect">
+            <a:avLst/>
+          </a:prstGeom>
+        </p:spPr>
+        <p:txBody>
+          <a:bodyPr vert="horz" lIns="91440" tIns="45720" rIns="91440" bIns="45720" rtlCol="0">
+            <a:normAutofit fontScale="92500" lnSpcReduction="20000"/>
+          </a:bodyPr>
+          <a:lstStyle>
+            <a:lvl1pPr marL="228600" indent="-228600" algn="l" defTabSz="914400" rtl="0" eaLnBrk="1" latinLnBrk="0" hangingPunct="1">
+              <a:lnSpc>
+                <a:spcPct val="90000"/>
+              </a:lnSpc>
+              <a:spcBef>
+                <a:spcPts val="1000"/>
+              </a:spcBef>
+              <a:buFont typeface="Arial" panose="020B0604020202020204" pitchFamily="34" charset="0"/>
+              <a:buChar char="•"/>
+              <a:defRPr sz="2800" kern="1200">
+                <a:solidFill>
+                  <a:schemeClr val="tx1"/>
+                </a:solidFill>
+                <a:latin typeface="+mn-lt"/>
+                <a:ea typeface="+mn-ea"/>
+                <a:cs typeface="+mn-cs"/>
+              </a:defRPr>
+            </a:lvl1pPr>
+            <a:lvl2pPr marL="685800" indent="-228600" algn="l" defTabSz="914400" rtl="0" eaLnBrk="1" latinLnBrk="0" hangingPunct="1">
+              <a:lnSpc>
+                <a:spcPct val="90000"/>
+              </a:lnSpc>
+              <a:spcBef>
+                <a:spcPts val="500"/>
+              </a:spcBef>
+              <a:buFont typeface="Arial" panose="020B0604020202020204" pitchFamily="34" charset="0"/>
+              <a:buChar char="•"/>
+              <a:defRPr sz="2400" kern="1200">
+                <a:solidFill>
+                  <a:schemeClr val="tx1"/>
+                </a:solidFill>
+                <a:latin typeface="+mn-lt"/>
+                <a:ea typeface="+mn-ea"/>
+                <a:cs typeface="+mn-cs"/>
+              </a:defRPr>
+            </a:lvl2pPr>
+            <a:lvl3pPr marL="1143000" indent="-228600" algn="l" defTabSz="914400" rtl="0" eaLnBrk="1" latinLnBrk="0" hangingPunct="1">
+              <a:lnSpc>
+                <a:spcPct val="90000"/>
+              </a:lnSpc>
+              <a:spcBef>
+                <a:spcPts val="500"/>
+              </a:spcBef>
+              <a:buFont typeface="Arial" panose="020B0604020202020204" pitchFamily="34" charset="0"/>
+              <a:buChar char="•"/>
+              <a:defRPr sz="2000" kern="1200">
+                <a:solidFill>
+                  <a:schemeClr val="tx1"/>
+                </a:solidFill>
+                <a:latin typeface="+mn-lt"/>
+                <a:ea typeface="+mn-ea"/>
+                <a:cs typeface="+mn-cs"/>
+              </a:defRPr>
+            </a:lvl3pPr>
+            <a:lvl4pPr marL="1600200" indent="-228600" algn="l" defTabSz="914400" rtl="0" eaLnBrk="1" latinLnBrk="0" hangingPunct="1">
+              <a:lnSpc>
+                <a:spcPct val="90000"/>
+              </a:lnSpc>
+              <a:spcBef>
+                <a:spcPts val="500"/>
+              </a:spcBef>
+              <a:buFont typeface="Arial" panose="020B0604020202020204" pitchFamily="34" charset="0"/>
+              <a:buChar char="•"/>
+              <a:defRPr sz="1800" kern="1200">
+                <a:solidFill>
+                  <a:schemeClr val="tx1"/>
+                </a:solidFill>
+                <a:latin typeface="+mn-lt"/>
+                <a:ea typeface="+mn-ea"/>
+                <a:cs typeface="+mn-cs"/>
+              </a:defRPr>
+            </a:lvl4pPr>
+            <a:lvl5pPr marL="2057400" indent="-228600" algn="l" defTabSz="914400" rtl="0" eaLnBrk="1" latinLnBrk="0" hangingPunct="1">
+              <a:lnSpc>
+                <a:spcPct val="90000"/>
+              </a:lnSpc>
+              <a:spcBef>
+                <a:spcPts val="500"/>
+              </a:spcBef>
+              <a:buFont typeface="Arial" panose="020B0604020202020204" pitchFamily="34" charset="0"/>
+              <a:buChar char="•"/>
+              <a:defRPr sz="1800" kern="1200">
+                <a:solidFill>
+                  <a:schemeClr val="tx1"/>
+                </a:solidFill>
+                <a:latin typeface="+mn-lt"/>
+                <a:ea typeface="+mn-ea"/>
+                <a:cs typeface="+mn-cs"/>
+              </a:defRPr>
+            </a:lvl5pPr>
+            <a:lvl6pPr marL="2514600" indent="-228600" algn="l" defTabSz="914400" rtl="0" eaLnBrk="1" latinLnBrk="0" hangingPunct="1">
+              <a:lnSpc>
+                <a:spcPct val="90000"/>
+              </a:lnSpc>
+              <a:spcBef>
+                <a:spcPts val="500"/>
+              </a:spcBef>
+              <a:buFont typeface="Arial" panose="020B0604020202020204" pitchFamily="34" charset="0"/>
+              <a:buChar char="•"/>
+              <a:defRPr sz="1800" kern="1200">
+                <a:solidFill>
+                  <a:schemeClr val="tx1"/>
+                </a:solidFill>
+                <a:latin typeface="+mn-lt"/>
+                <a:ea typeface="+mn-ea"/>
+                <a:cs typeface="+mn-cs"/>
+              </a:defRPr>
+            </a:lvl6pPr>
+            <a:lvl7pPr marL="2971800" indent="-228600" algn="l" defTabSz="914400" rtl="0" eaLnBrk="1" latinLnBrk="0" hangingPunct="1">
+              <a:lnSpc>
+                <a:spcPct val="90000"/>
+              </a:lnSpc>
+              <a:spcBef>
+                <a:spcPts val="500"/>
+              </a:spcBef>
+              <a:buFont typeface="Arial" panose="020B0604020202020204" pitchFamily="34" charset="0"/>
+              <a:buChar char="•"/>
+              <a:defRPr sz="1800" kern="1200">
+                <a:solidFill>
+                  <a:schemeClr val="tx1"/>
+                </a:solidFill>
+                <a:latin typeface="+mn-lt"/>
+                <a:ea typeface="+mn-ea"/>
+                <a:cs typeface="+mn-cs"/>
+              </a:defRPr>
+            </a:lvl7pPr>
+            <a:lvl8pPr marL="3429000" indent="-228600" algn="l" defTabSz="914400" rtl="0" eaLnBrk="1" latinLnBrk="0" hangingPunct="1">
+              <a:lnSpc>
+                <a:spcPct val="90000"/>
+              </a:lnSpc>
+              <a:spcBef>
+                <a:spcPts val="500"/>
+              </a:spcBef>
+              <a:buFont typeface="Arial" panose="020B0604020202020204" pitchFamily="34" charset="0"/>
+              <a:buChar char="•"/>
+              <a:defRPr sz="1800" kern="1200">
+                <a:solidFill>
+                  <a:schemeClr val="tx1"/>
+                </a:solidFill>
+                <a:latin typeface="+mn-lt"/>
+                <a:ea typeface="+mn-ea"/>
+                <a:cs typeface="+mn-cs"/>
+              </a:defRPr>
+            </a:lvl8pPr>
+            <a:lvl9pPr marL="3886200" indent="-228600" algn="l" defTabSz="914400" rtl="0" eaLnBrk="1" latinLnBrk="0" hangingPunct="1">
+              <a:lnSpc>
+                <a:spcPct val="90000"/>
+              </a:lnSpc>
+              <a:spcBef>
+                <a:spcPts val="500"/>
+              </a:spcBef>
+              <a:buFont typeface="Arial" panose="020B0604020202020204" pitchFamily="34" charset="0"/>
+              <a:buChar char="•"/>
+              <a:defRPr sz="1800" kern="1200">
+                <a:solidFill>
+                  <a:schemeClr val="tx1"/>
+                </a:solidFill>
+                <a:latin typeface="+mn-lt"/>
+                <a:ea typeface="+mn-ea"/>
+                <a:cs typeface="+mn-cs"/>
+              </a:defRPr>
+            </a:lvl9pPr>
+          </a:lstStyle>
+          <a:p>
+            <a:pPr marL="0" indent="0">
+              <a:buFont typeface="Arial" panose="020B0604020202020204" pitchFamily="34" charset="0"/>
+              <a:buNone/>
+            </a:pPr>
+            <a:r>
+              <a:rPr lang="fr-FR" b="1" dirty="0"/>
+              <a:t>Remarque</a:t>
+            </a:r>
+          </a:p>
+          <a:p>
+            <a:pPr marL="0" indent="0">
+              <a:buFont typeface="Arial" panose="020B0604020202020204" pitchFamily="34" charset="0"/>
+              <a:buNone/>
+            </a:pPr>
+            <a:r>
+              <a:rPr lang="fr-FR" dirty="0"/>
+              <a:t>Le </a:t>
+            </a:r>
+            <a:r>
+              <a:rPr lang="fr-FR" dirty="0" err="1"/>
+              <a:t>null</a:t>
+            </a:r>
+            <a:r>
+              <a:rPr lang="fr-FR" dirty="0"/>
+              <a:t> est la cause numéro 1 des exceptions : éviter son usage implicite améliore la robustesse et la lisibilité du code.</a:t>
+            </a:r>
+          </a:p>
+          <a:p>
+            <a:pPr marL="0" indent="0">
+              <a:buFont typeface="Arial" panose="020B0604020202020204" pitchFamily="34" charset="0"/>
+              <a:buNone/>
+            </a:pPr>
+            <a:r>
+              <a:rPr lang="fr-FR" dirty="0"/>
+              <a:t> </a:t>
+            </a:r>
+          </a:p>
+          <a:p>
+            <a:pPr lvl="1"/>
+            <a:endParaRPr lang="fr-FR" dirty="0"/>
+          </a:p>
+          <a:p>
+            <a:pPr marL="0" indent="0">
+              <a:buFont typeface="Arial" panose="020B0604020202020204" pitchFamily="34" charset="0"/>
+              <a:buNone/>
+            </a:pPr>
+            <a:endParaRPr lang="fr-FR" dirty="0"/>
+          </a:p>
+        </p:txBody>
+      </p:sp>
+    </p:spTree>
+    <p:extLst>
+      <p:ext uri="{BB962C8B-B14F-4D97-AF65-F5344CB8AC3E}">
+        <p14:creationId xmlns:p14="http://schemas.microsoft.com/office/powerpoint/2010/main" val="3030733871"/>
+      </p:ext>
+    </p:extLst>
+  </p:cSld>
+  <p:clrMapOvr>
+    <a:masterClrMapping/>
+  </p:clrMapOvr>
+</p:sld>
+</file>
+
+<file path=ppt/slides/slide4.xml><?xml version="1.0" encoding="utf-8"?>
+<p:sld xmlns:a="http://schemas.openxmlformats.org/drawingml/2006/main" xmlns:r="http://schemas.openxmlformats.org/officeDocument/2006/relationships" xmlns:p="http://schemas.openxmlformats.org/presentationml/2006/main">
+  <p:cSld>
+    <p:spTree>
+      <p:nvGrpSpPr>
+        <p:cNvPr id="1" name=""/>
+        <p:cNvGrpSpPr/>
+        <p:nvPr/>
+      </p:nvGrpSpPr>
+      <p:grpSpPr>
+        <a:xfrm>
+          <a:off x="0" y="0"/>
+          <a:ext cx="0" cy="0"/>
+          <a:chOff x="0" y="0"/>
+          <a:chExt cx="0" cy="0"/>
+        </a:xfrm>
+      </p:grpSpPr>
+      <p:sp>
+        <p:nvSpPr>
+          <p:cNvPr id="2" name="Titre 1">
+            <a:extLst>
+              <a:ext uri="{FF2B5EF4-FFF2-40B4-BE49-F238E27FC236}">
+                <a16:creationId xmlns:a16="http://schemas.microsoft.com/office/drawing/2014/main" id="{A921CB2D-A829-95BD-CFD9-B619C81F864D}"/>
+              </a:ext>
+            </a:extLst>
+          </p:cNvPr>
+          <p:cNvSpPr>
+            <a:spLocks noGrp="1"/>
+          </p:cNvSpPr>
+          <p:nvPr>
+            <p:ph type="title"/>
+          </p:nvPr>
+        </p:nvSpPr>
+        <p:spPr/>
+        <p:txBody>
+          <a:bodyPr/>
+          <a:lstStyle/>
+          <a:p>
+            <a:r>
+              <a:rPr lang="fr-FR" dirty="0">
+                <a:sym typeface="Wingdings" panose="05000000000000000000" pitchFamily="2" charset="2"/>
+              </a:rPr>
+              <a:t>U</a:t>
+            </a:r>
+            <a:r>
+              <a:rPr lang="fr-FR" dirty="0"/>
+              <a:t>n piège courant en programmation orientée objet </a:t>
+            </a:r>
+            <a:r>
+              <a:rPr lang="fr-FR" dirty="0">
+                <a:sym typeface="Wingdings" panose="05000000000000000000" pitchFamily="2" charset="2"/>
+              </a:rPr>
+              <a:t> NULL</a:t>
+            </a:r>
+            <a:endParaRPr lang="fr-FR" dirty="0"/>
+          </a:p>
+        </p:txBody>
+      </p:sp>
+      <p:sp>
+        <p:nvSpPr>
+          <p:cNvPr id="3" name="Espace réservé du contenu 2">
+            <a:extLst>
+              <a:ext uri="{FF2B5EF4-FFF2-40B4-BE49-F238E27FC236}">
+                <a16:creationId xmlns:a16="http://schemas.microsoft.com/office/drawing/2014/main" id="{B106DBAC-3AD1-FE20-EB7D-54D73C69FCD9}"/>
+              </a:ext>
+            </a:extLst>
+          </p:cNvPr>
+          <p:cNvSpPr>
+            <a:spLocks noGrp="1"/>
+          </p:cNvSpPr>
+          <p:nvPr>
+            <p:ph idx="1"/>
+          </p:nvPr>
+        </p:nvSpPr>
+        <p:spPr>
+          <a:xfrm>
+            <a:off x="2564537" y="2198487"/>
+            <a:ext cx="7062926" cy="3687408"/>
+          </a:xfrm>
+        </p:spPr>
+        <p:txBody>
+          <a:bodyPr>
+            <a:normAutofit/>
+          </a:bodyPr>
+          <a:lstStyle/>
+          <a:p>
+            <a:pPr marL="0" indent="0">
+              <a:buNone/>
+            </a:pPr>
+            <a:r>
+              <a:rPr lang="fr-FR" b="1" dirty="0"/>
+              <a:t>Solutions en C#</a:t>
+            </a:r>
+          </a:p>
+          <a:p>
+            <a:pPr lvl="1"/>
+            <a:r>
+              <a:rPr lang="fr-FR" dirty="0" err="1"/>
+              <a:t>Nullable</a:t>
+            </a:r>
+            <a:r>
+              <a:rPr lang="fr-FR" dirty="0"/>
+              <a:t> </a:t>
+            </a:r>
+            <a:r>
+              <a:rPr lang="fr-FR" dirty="0" err="1"/>
+              <a:t>reference</a:t>
+            </a:r>
+            <a:r>
+              <a:rPr lang="fr-FR" dirty="0"/>
+              <a:t> types (#nullable enable)</a:t>
+            </a:r>
+          </a:p>
+          <a:p>
+            <a:pPr lvl="1"/>
+            <a:r>
+              <a:rPr lang="fr-FR" dirty="0"/>
+              <a:t>Supprimer ? sur les paramètres obligatoires</a:t>
+            </a:r>
+          </a:p>
+          <a:p>
+            <a:pPr lvl="1"/>
+            <a:r>
+              <a:rPr lang="fr-FR" dirty="0"/>
+              <a:t>Guard Clauses pour la validation immédiate</a:t>
+            </a:r>
+          </a:p>
+          <a:p>
+            <a:pPr lvl="1"/>
+            <a:r>
+              <a:rPr lang="fr-FR" dirty="0"/>
+              <a:t>Retourner des collections vides au lieu de </a:t>
+            </a:r>
+            <a:r>
+              <a:rPr lang="fr-FR" dirty="0" err="1"/>
+              <a:t>null</a:t>
+            </a:r>
+            <a:endParaRPr lang="fr-FR" dirty="0"/>
+          </a:p>
+          <a:p>
+            <a:pPr lvl="1"/>
+            <a:r>
+              <a:rPr lang="fr-FR" dirty="0"/>
+              <a:t>Value </a:t>
+            </a:r>
+            <a:r>
+              <a:rPr lang="fr-FR" dirty="0" err="1"/>
+              <a:t>Objects</a:t>
+            </a:r>
+            <a:r>
+              <a:rPr lang="fr-FR" dirty="0"/>
+              <a:t> pour encapsuler les règles métier</a:t>
+            </a:r>
+          </a:p>
+          <a:p>
+            <a:pPr lvl="1"/>
+            <a:r>
+              <a:rPr lang="fr-FR" dirty="0"/>
+              <a:t>Modéliser explicitement l'absence de valeur</a:t>
+            </a:r>
+          </a:p>
+          <a:p>
+            <a:pPr lvl="2"/>
+            <a:r>
+              <a:rPr lang="fr-FR" dirty="0"/>
+              <a:t>Option&lt;T&gt;, </a:t>
+            </a:r>
+            <a:r>
+              <a:rPr lang="fr-FR" dirty="0" err="1"/>
+              <a:t>Result</a:t>
+            </a:r>
+            <a:r>
+              <a:rPr lang="fr-FR" dirty="0"/>
+              <a:t>&lt;T, </a:t>
+            </a:r>
+            <a:r>
+              <a:rPr lang="fr-FR" dirty="0" err="1"/>
+              <a:t>TError</a:t>
+            </a:r>
+            <a:r>
+              <a:rPr lang="fr-FR" dirty="0"/>
+              <a:t>&gt;, </a:t>
+            </a:r>
+            <a:r>
+              <a:rPr lang="fr-FR" dirty="0" err="1"/>
+              <a:t>TryGetXxx</a:t>
+            </a:r>
+            <a:r>
+              <a:rPr lang="fr-FR" dirty="0"/>
+              <a:t>(out value)</a:t>
+            </a:r>
+          </a:p>
+          <a:p>
+            <a:pPr lvl="1"/>
+            <a:r>
+              <a:rPr lang="fr-FR" dirty="0" err="1"/>
+              <a:t>Null</a:t>
+            </a:r>
+            <a:r>
+              <a:rPr lang="fr-FR" dirty="0"/>
+              <a:t> Object Pattern (complément)</a:t>
+            </a:r>
+          </a:p>
+          <a:p>
+            <a:endParaRPr lang="fr-FR" dirty="0"/>
+          </a:p>
+        </p:txBody>
+      </p:sp>
+    </p:spTree>
+    <p:extLst>
+      <p:ext uri="{BB962C8B-B14F-4D97-AF65-F5344CB8AC3E}">
+        <p14:creationId xmlns:p14="http://schemas.microsoft.com/office/powerpoint/2010/main" val="2362276289"/>
+      </p:ext>
+    </p:extLst>
+  </p:cSld>
+  <p:clrMapOvr>
+    <a:masterClrMapping/>
+  </p:clrMapOvr>
+</p:sld>
+</file>
+
 <file path=ppt/theme/theme1.xml><?xml version="1.0" encoding="utf-8"?>
 <a:theme xmlns:a="http://schemas.openxmlformats.org/drawingml/2006/main" name="Thème Office">
   <a:themeElements>

</xml_diff>

<commit_message>
Encapsulate primitives in Value Objects to avoid Primitive Obsession
</commit_message>
<xml_diff>
--- a/Elegant_Objects.pptx
+++ b/Elegant_Objects.pptx
@@ -9,6 +9,7 @@
     <p:sldId id="257" r:id="rId3"/>
     <p:sldId id="258" r:id="rId4"/>
     <p:sldId id="259" r:id="rId5"/>
+    <p:sldId id="260" r:id="rId6"/>
   </p:sldIdLst>
   <p:sldSz cx="12192000" cy="6858000"/>
   <p:notesSz cx="6858000" cy="9144000"/>
@@ -262,7 +263,7 @@
           <a:p>
             <a:fld id="{CF2ECFED-0AE4-4F4D-9F93-28B3B5AEC0C8}" type="datetimeFigureOut">
               <a:rPr lang="fr-FR" smtClean="0"/>
-              <a:t>09/06/2025</a:t>
+              <a:t>10/06/2025</a:t>
             </a:fld>
             <a:endParaRPr lang="fr-FR"/>
           </a:p>
@@ -460,7 +461,7 @@
           <a:p>
             <a:fld id="{CF2ECFED-0AE4-4F4D-9F93-28B3B5AEC0C8}" type="datetimeFigureOut">
               <a:rPr lang="fr-FR" smtClean="0"/>
-              <a:t>09/06/2025</a:t>
+              <a:t>10/06/2025</a:t>
             </a:fld>
             <a:endParaRPr lang="fr-FR"/>
           </a:p>
@@ -668,7 +669,7 @@
           <a:p>
             <a:fld id="{CF2ECFED-0AE4-4F4D-9F93-28B3B5AEC0C8}" type="datetimeFigureOut">
               <a:rPr lang="fr-FR" smtClean="0"/>
-              <a:t>09/06/2025</a:t>
+              <a:t>10/06/2025</a:t>
             </a:fld>
             <a:endParaRPr lang="fr-FR"/>
           </a:p>
@@ -866,7 +867,7 @@
           <a:p>
             <a:fld id="{CF2ECFED-0AE4-4F4D-9F93-28B3B5AEC0C8}" type="datetimeFigureOut">
               <a:rPr lang="fr-FR" smtClean="0"/>
-              <a:t>09/06/2025</a:t>
+              <a:t>10/06/2025</a:t>
             </a:fld>
             <a:endParaRPr lang="fr-FR"/>
           </a:p>
@@ -1141,7 +1142,7 @@
           <a:p>
             <a:fld id="{CF2ECFED-0AE4-4F4D-9F93-28B3B5AEC0C8}" type="datetimeFigureOut">
               <a:rPr lang="fr-FR" smtClean="0"/>
-              <a:t>09/06/2025</a:t>
+              <a:t>10/06/2025</a:t>
             </a:fld>
             <a:endParaRPr lang="fr-FR"/>
           </a:p>
@@ -1406,7 +1407,7 @@
           <a:p>
             <a:fld id="{CF2ECFED-0AE4-4F4D-9F93-28B3B5AEC0C8}" type="datetimeFigureOut">
               <a:rPr lang="fr-FR" smtClean="0"/>
-              <a:t>09/06/2025</a:t>
+              <a:t>10/06/2025</a:t>
             </a:fld>
             <a:endParaRPr lang="fr-FR"/>
           </a:p>
@@ -1818,7 +1819,7 @@
           <a:p>
             <a:fld id="{CF2ECFED-0AE4-4F4D-9F93-28B3B5AEC0C8}" type="datetimeFigureOut">
               <a:rPr lang="fr-FR" smtClean="0"/>
-              <a:t>09/06/2025</a:t>
+              <a:t>10/06/2025</a:t>
             </a:fld>
             <a:endParaRPr lang="fr-FR"/>
           </a:p>
@@ -1959,7 +1960,7 @@
           <a:p>
             <a:fld id="{CF2ECFED-0AE4-4F4D-9F93-28B3B5AEC0C8}" type="datetimeFigureOut">
               <a:rPr lang="fr-FR" smtClean="0"/>
-              <a:t>09/06/2025</a:t>
+              <a:t>10/06/2025</a:t>
             </a:fld>
             <a:endParaRPr lang="fr-FR"/>
           </a:p>
@@ -2072,7 +2073,7 @@
           <a:p>
             <a:fld id="{CF2ECFED-0AE4-4F4D-9F93-28B3B5AEC0C8}" type="datetimeFigureOut">
               <a:rPr lang="fr-FR" smtClean="0"/>
-              <a:t>09/06/2025</a:t>
+              <a:t>10/06/2025</a:t>
             </a:fld>
             <a:endParaRPr lang="fr-FR"/>
           </a:p>
@@ -2383,7 +2384,7 @@
           <a:p>
             <a:fld id="{CF2ECFED-0AE4-4F4D-9F93-28B3B5AEC0C8}" type="datetimeFigureOut">
               <a:rPr lang="fr-FR" smtClean="0"/>
-              <a:t>09/06/2025</a:t>
+              <a:t>10/06/2025</a:t>
             </a:fld>
             <a:endParaRPr lang="fr-FR"/>
           </a:p>
@@ -2671,7 +2672,7 @@
           <a:p>
             <a:fld id="{CF2ECFED-0AE4-4F4D-9F93-28B3B5AEC0C8}" type="datetimeFigureOut">
               <a:rPr lang="fr-FR" smtClean="0"/>
-              <a:t>09/06/2025</a:t>
+              <a:t>10/06/2025</a:t>
             </a:fld>
             <a:endParaRPr lang="fr-FR"/>
           </a:p>
@@ -2912,7 +2913,7 @@
           <a:p>
             <a:fld id="{CF2ECFED-0AE4-4F4D-9F93-28B3B5AEC0C8}" type="datetimeFigureOut">
               <a:rPr lang="fr-FR" smtClean="0"/>
-              <a:t>09/06/2025</a:t>
+              <a:t>10/06/2025</a:t>
             </a:fld>
             <a:endParaRPr lang="fr-FR"/>
           </a:p>
@@ -5043,6 +5044,373 @@
 </p:sld>
 </file>
 
+<file path=ppt/slides/slide5.xml><?xml version="1.0" encoding="utf-8"?>
+<p:sld xmlns:a="http://schemas.openxmlformats.org/drawingml/2006/main" xmlns:r="http://schemas.openxmlformats.org/officeDocument/2006/relationships" xmlns:p="http://schemas.openxmlformats.org/presentationml/2006/main">
+  <p:cSld>
+    <p:spTree>
+      <p:nvGrpSpPr>
+        <p:cNvPr id="1" name=""/>
+        <p:cNvGrpSpPr/>
+        <p:nvPr/>
+      </p:nvGrpSpPr>
+      <p:grpSpPr>
+        <a:xfrm>
+          <a:off x="0" y="0"/>
+          <a:ext cx="0" cy="0"/>
+          <a:chOff x="0" y="0"/>
+          <a:chExt cx="0" cy="0"/>
+        </a:xfrm>
+      </p:grpSpPr>
+      <p:sp>
+        <p:nvSpPr>
+          <p:cNvPr id="2" name="Titre 1">
+            <a:extLst>
+              <a:ext uri="{FF2B5EF4-FFF2-40B4-BE49-F238E27FC236}">
+                <a16:creationId xmlns:a16="http://schemas.microsoft.com/office/drawing/2014/main" id="{BE68606C-F899-325C-0FCC-68F16D955315}"/>
+              </a:ext>
+            </a:extLst>
+          </p:cNvPr>
+          <p:cNvSpPr>
+            <a:spLocks noGrp="1"/>
+          </p:cNvSpPr>
+          <p:nvPr>
+            <p:ph type="title"/>
+          </p:nvPr>
+        </p:nvSpPr>
+        <p:spPr/>
+        <p:txBody>
+          <a:bodyPr/>
+          <a:lstStyle/>
+          <a:p>
+            <a:r>
+              <a:rPr lang="fr-FR" dirty="0"/>
+              <a:t>Primitive Obsession </a:t>
+            </a:r>
+            <a:r>
+              <a:rPr lang="fr-FR" dirty="0">
+                <a:sym typeface="Wingdings" panose="05000000000000000000" pitchFamily="2" charset="2"/>
+              </a:rPr>
+              <a:t> Value Object</a:t>
+            </a:r>
+            <a:endParaRPr lang="fr-FR" dirty="0"/>
+          </a:p>
+        </p:txBody>
+      </p:sp>
+      <p:sp>
+        <p:nvSpPr>
+          <p:cNvPr id="3" name="Espace réservé du contenu 2">
+            <a:extLst>
+              <a:ext uri="{FF2B5EF4-FFF2-40B4-BE49-F238E27FC236}">
+                <a16:creationId xmlns:a16="http://schemas.microsoft.com/office/drawing/2014/main" id="{2317A5F5-04CF-C801-82F1-E95F72980C0E}"/>
+              </a:ext>
+            </a:extLst>
+          </p:cNvPr>
+          <p:cNvSpPr>
+            <a:spLocks noGrp="1"/>
+          </p:cNvSpPr>
+          <p:nvPr>
+            <p:ph idx="1"/>
+          </p:nvPr>
+        </p:nvSpPr>
+        <p:spPr>
+          <a:xfrm>
+            <a:off x="838200" y="1825625"/>
+            <a:ext cx="8723050" cy="1982895"/>
+          </a:xfrm>
+        </p:spPr>
+        <p:txBody>
+          <a:bodyPr/>
+          <a:lstStyle/>
+          <a:p>
+            <a:pPr marL="0" indent="0">
+              <a:buNone/>
+            </a:pPr>
+            <a:r>
+              <a:rPr lang="fr-FR" dirty="0"/>
+              <a:t>Problèmes </a:t>
+            </a:r>
+          </a:p>
+          <a:p>
+            <a:pPr lvl="1"/>
+            <a:r>
+              <a:rPr lang="fr-FR" dirty="0"/>
+              <a:t>Manque d’expressivité du code</a:t>
+            </a:r>
+          </a:p>
+          <a:p>
+            <a:pPr lvl="1"/>
+            <a:r>
+              <a:rPr lang="fr-FR" dirty="0"/>
+              <a:t>Risque d’erreurs (ex: inversion d’arguments, valeurs invalides)</a:t>
+            </a:r>
+          </a:p>
+          <a:p>
+            <a:pPr lvl="1"/>
+            <a:r>
+              <a:rPr lang="fr-FR" dirty="0"/>
+              <a:t>Pas de validation centralisée → duplication de la logique</a:t>
+            </a:r>
+          </a:p>
+        </p:txBody>
+      </p:sp>
+      <p:sp>
+        <p:nvSpPr>
+          <p:cNvPr id="4" name="Espace réservé du contenu 2">
+            <a:extLst>
+              <a:ext uri="{FF2B5EF4-FFF2-40B4-BE49-F238E27FC236}">
+                <a16:creationId xmlns:a16="http://schemas.microsoft.com/office/drawing/2014/main" id="{3CC732A7-9F63-F575-6102-D4308222BB75}"/>
+              </a:ext>
+            </a:extLst>
+          </p:cNvPr>
+          <p:cNvSpPr txBox="1">
+            <a:spLocks/>
+          </p:cNvSpPr>
+          <p:nvPr/>
+        </p:nvSpPr>
+        <p:spPr>
+          <a:xfrm>
+            <a:off x="838200" y="3808520"/>
+            <a:ext cx="6867617" cy="1982895"/>
+          </a:xfrm>
+          <a:prstGeom prst="rect">
+            <a:avLst/>
+          </a:prstGeom>
+        </p:spPr>
+        <p:txBody>
+          <a:bodyPr vert="horz" lIns="91440" tIns="45720" rIns="91440" bIns="45720" rtlCol="0">
+            <a:normAutofit lnSpcReduction="10000"/>
+          </a:bodyPr>
+          <a:lstStyle>
+            <a:lvl1pPr marL="228600" indent="-228600" algn="l" defTabSz="914400" rtl="0" eaLnBrk="1" latinLnBrk="0" hangingPunct="1">
+              <a:lnSpc>
+                <a:spcPct val="90000"/>
+              </a:lnSpc>
+              <a:spcBef>
+                <a:spcPts val="1000"/>
+              </a:spcBef>
+              <a:buFont typeface="Arial" panose="020B0604020202020204" pitchFamily="34" charset="0"/>
+              <a:buChar char="•"/>
+              <a:defRPr sz="2800" kern="1200">
+                <a:solidFill>
+                  <a:schemeClr val="tx1"/>
+                </a:solidFill>
+                <a:latin typeface="+mn-lt"/>
+                <a:ea typeface="+mn-ea"/>
+                <a:cs typeface="+mn-cs"/>
+              </a:defRPr>
+            </a:lvl1pPr>
+            <a:lvl2pPr marL="685800" indent="-228600" algn="l" defTabSz="914400" rtl="0" eaLnBrk="1" latinLnBrk="0" hangingPunct="1">
+              <a:lnSpc>
+                <a:spcPct val="90000"/>
+              </a:lnSpc>
+              <a:spcBef>
+                <a:spcPts val="500"/>
+              </a:spcBef>
+              <a:buFont typeface="Arial" panose="020B0604020202020204" pitchFamily="34" charset="0"/>
+              <a:buChar char="•"/>
+              <a:defRPr sz="2400" kern="1200">
+                <a:solidFill>
+                  <a:schemeClr val="tx1"/>
+                </a:solidFill>
+                <a:latin typeface="+mn-lt"/>
+                <a:ea typeface="+mn-ea"/>
+                <a:cs typeface="+mn-cs"/>
+              </a:defRPr>
+            </a:lvl2pPr>
+            <a:lvl3pPr marL="1143000" indent="-228600" algn="l" defTabSz="914400" rtl="0" eaLnBrk="1" latinLnBrk="0" hangingPunct="1">
+              <a:lnSpc>
+                <a:spcPct val="90000"/>
+              </a:lnSpc>
+              <a:spcBef>
+                <a:spcPts val="500"/>
+              </a:spcBef>
+              <a:buFont typeface="Arial" panose="020B0604020202020204" pitchFamily="34" charset="0"/>
+              <a:buChar char="•"/>
+              <a:defRPr sz="2000" kern="1200">
+                <a:solidFill>
+                  <a:schemeClr val="tx1"/>
+                </a:solidFill>
+                <a:latin typeface="+mn-lt"/>
+                <a:ea typeface="+mn-ea"/>
+                <a:cs typeface="+mn-cs"/>
+              </a:defRPr>
+            </a:lvl3pPr>
+            <a:lvl4pPr marL="1600200" indent="-228600" algn="l" defTabSz="914400" rtl="0" eaLnBrk="1" latinLnBrk="0" hangingPunct="1">
+              <a:lnSpc>
+                <a:spcPct val="90000"/>
+              </a:lnSpc>
+              <a:spcBef>
+                <a:spcPts val="500"/>
+              </a:spcBef>
+              <a:buFont typeface="Arial" panose="020B0604020202020204" pitchFamily="34" charset="0"/>
+              <a:buChar char="•"/>
+              <a:defRPr sz="1800" kern="1200">
+                <a:solidFill>
+                  <a:schemeClr val="tx1"/>
+                </a:solidFill>
+                <a:latin typeface="+mn-lt"/>
+                <a:ea typeface="+mn-ea"/>
+                <a:cs typeface="+mn-cs"/>
+              </a:defRPr>
+            </a:lvl4pPr>
+            <a:lvl5pPr marL="2057400" indent="-228600" algn="l" defTabSz="914400" rtl="0" eaLnBrk="1" latinLnBrk="0" hangingPunct="1">
+              <a:lnSpc>
+                <a:spcPct val="90000"/>
+              </a:lnSpc>
+              <a:spcBef>
+                <a:spcPts val="500"/>
+              </a:spcBef>
+              <a:buFont typeface="Arial" panose="020B0604020202020204" pitchFamily="34" charset="0"/>
+              <a:buChar char="•"/>
+              <a:defRPr sz="1800" kern="1200">
+                <a:solidFill>
+                  <a:schemeClr val="tx1"/>
+                </a:solidFill>
+                <a:latin typeface="+mn-lt"/>
+                <a:ea typeface="+mn-ea"/>
+                <a:cs typeface="+mn-cs"/>
+              </a:defRPr>
+            </a:lvl5pPr>
+            <a:lvl6pPr marL="2514600" indent="-228600" algn="l" defTabSz="914400" rtl="0" eaLnBrk="1" latinLnBrk="0" hangingPunct="1">
+              <a:lnSpc>
+                <a:spcPct val="90000"/>
+              </a:lnSpc>
+              <a:spcBef>
+                <a:spcPts val="500"/>
+              </a:spcBef>
+              <a:buFont typeface="Arial" panose="020B0604020202020204" pitchFamily="34" charset="0"/>
+              <a:buChar char="•"/>
+              <a:defRPr sz="1800" kern="1200">
+                <a:solidFill>
+                  <a:schemeClr val="tx1"/>
+                </a:solidFill>
+                <a:latin typeface="+mn-lt"/>
+                <a:ea typeface="+mn-ea"/>
+                <a:cs typeface="+mn-cs"/>
+              </a:defRPr>
+            </a:lvl6pPr>
+            <a:lvl7pPr marL="2971800" indent="-228600" algn="l" defTabSz="914400" rtl="0" eaLnBrk="1" latinLnBrk="0" hangingPunct="1">
+              <a:lnSpc>
+                <a:spcPct val="90000"/>
+              </a:lnSpc>
+              <a:spcBef>
+                <a:spcPts val="500"/>
+              </a:spcBef>
+              <a:buFont typeface="Arial" panose="020B0604020202020204" pitchFamily="34" charset="0"/>
+              <a:buChar char="•"/>
+              <a:defRPr sz="1800" kern="1200">
+                <a:solidFill>
+                  <a:schemeClr val="tx1"/>
+                </a:solidFill>
+                <a:latin typeface="+mn-lt"/>
+                <a:ea typeface="+mn-ea"/>
+                <a:cs typeface="+mn-cs"/>
+              </a:defRPr>
+            </a:lvl7pPr>
+            <a:lvl8pPr marL="3429000" indent="-228600" algn="l" defTabSz="914400" rtl="0" eaLnBrk="1" latinLnBrk="0" hangingPunct="1">
+              <a:lnSpc>
+                <a:spcPct val="90000"/>
+              </a:lnSpc>
+              <a:spcBef>
+                <a:spcPts val="500"/>
+              </a:spcBef>
+              <a:buFont typeface="Arial" panose="020B0604020202020204" pitchFamily="34" charset="0"/>
+              <a:buChar char="•"/>
+              <a:defRPr sz="1800" kern="1200">
+                <a:solidFill>
+                  <a:schemeClr val="tx1"/>
+                </a:solidFill>
+                <a:latin typeface="+mn-lt"/>
+                <a:ea typeface="+mn-ea"/>
+                <a:cs typeface="+mn-cs"/>
+              </a:defRPr>
+            </a:lvl8pPr>
+            <a:lvl9pPr marL="3886200" indent="-228600" algn="l" defTabSz="914400" rtl="0" eaLnBrk="1" latinLnBrk="0" hangingPunct="1">
+              <a:lnSpc>
+                <a:spcPct val="90000"/>
+              </a:lnSpc>
+              <a:spcBef>
+                <a:spcPts val="500"/>
+              </a:spcBef>
+              <a:buFont typeface="Arial" panose="020B0604020202020204" pitchFamily="34" charset="0"/>
+              <a:buChar char="•"/>
+              <a:defRPr sz="1800" kern="1200">
+                <a:solidFill>
+                  <a:schemeClr val="tx1"/>
+                </a:solidFill>
+                <a:latin typeface="+mn-lt"/>
+                <a:ea typeface="+mn-ea"/>
+                <a:cs typeface="+mn-cs"/>
+              </a:defRPr>
+            </a:lvl9pPr>
+          </a:lstStyle>
+          <a:p>
+            <a:pPr marL="0" indent="0">
+              <a:buFont typeface="Arial" panose="020B0604020202020204" pitchFamily="34" charset="0"/>
+              <a:buNone/>
+            </a:pPr>
+            <a:r>
+              <a:rPr lang="fr-FR" dirty="0"/>
+              <a:t>Solution </a:t>
+            </a:r>
+            <a:r>
+              <a:rPr lang="fr-FR" dirty="0">
+                <a:sym typeface="Wingdings" panose="05000000000000000000" pitchFamily="2" charset="2"/>
+              </a:rPr>
+              <a:t> Value Object</a:t>
+            </a:r>
+            <a:r>
+              <a:rPr lang="fr-FR" dirty="0"/>
+              <a:t> </a:t>
+            </a:r>
+          </a:p>
+          <a:p>
+            <a:pPr lvl="1"/>
+            <a:r>
+              <a:rPr lang="fr-FR" dirty="0"/>
+              <a:t>Immuable</a:t>
+            </a:r>
+          </a:p>
+          <a:p>
+            <a:pPr lvl="1"/>
+            <a:r>
+              <a:rPr lang="fr-FR" dirty="0"/>
+              <a:t>A un sens métier explicite</a:t>
+            </a:r>
+          </a:p>
+          <a:p>
+            <a:pPr lvl="1"/>
+            <a:r>
+              <a:rPr lang="fr-FR" dirty="0"/>
+              <a:t>L'égalité se base sur les valeurs</a:t>
+            </a:r>
+          </a:p>
+          <a:p>
+            <a:pPr lvl="1"/>
+            <a:r>
+              <a:rPr lang="fr-FR" dirty="0"/>
+              <a:t>Encapsule une valeur ou un groupe de valeurs</a:t>
+            </a:r>
+          </a:p>
+          <a:p>
+            <a:pPr lvl="1"/>
+            <a:endParaRPr lang="fr-FR" dirty="0"/>
+          </a:p>
+        </p:txBody>
+      </p:sp>
+    </p:spTree>
+    <p:extLst>
+      <p:ext uri="{BB962C8B-B14F-4D97-AF65-F5344CB8AC3E}">
+        <p14:creationId xmlns:p14="http://schemas.microsoft.com/office/powerpoint/2010/main" val="162687470"/>
+      </p:ext>
+    </p:extLst>
+  </p:cSld>
+  <p:clrMapOvr>
+    <a:masterClrMapping/>
+  </p:clrMapOvr>
+</p:sld>
+</file>
+
 <file path=ppt/theme/theme1.xml><?xml version="1.0" encoding="utf-8"?>
 <a:theme xmlns:a="http://schemas.openxmlformats.org/drawingml/2006/main" name="Thème Office">
   <a:themeElements>

</xml_diff>

<commit_message>
Change Static Builder pattern to Factory Method pattern
</commit_message>
<xml_diff>
--- a/Elegant_Objects.pptx
+++ b/Elegant_Objects.pptx
@@ -10,6 +10,7 @@
     <p:sldId id="258" r:id="rId4"/>
     <p:sldId id="259" r:id="rId5"/>
     <p:sldId id="260" r:id="rId6"/>
+    <p:sldId id="261" r:id="rId7"/>
   </p:sldIdLst>
   <p:sldSz cx="12192000" cy="6858000"/>
   <p:notesSz cx="6858000" cy="9144000"/>
@@ -5178,6 +5179,643 @@
         </p:spPr>
         <p:txBody>
           <a:bodyPr vert="horz" lIns="91440" tIns="45720" rIns="91440" bIns="45720" rtlCol="0">
+            <a:normAutofit fontScale="92500" lnSpcReduction="20000"/>
+          </a:bodyPr>
+          <a:lstStyle>
+            <a:lvl1pPr marL="228600" indent="-228600" algn="l" defTabSz="914400" rtl="0" eaLnBrk="1" latinLnBrk="0" hangingPunct="1">
+              <a:lnSpc>
+                <a:spcPct val="90000"/>
+              </a:lnSpc>
+              <a:spcBef>
+                <a:spcPts val="1000"/>
+              </a:spcBef>
+              <a:buFont typeface="Arial" panose="020B0604020202020204" pitchFamily="34" charset="0"/>
+              <a:buChar char="•"/>
+              <a:defRPr sz="2800" kern="1200">
+                <a:solidFill>
+                  <a:schemeClr val="tx1"/>
+                </a:solidFill>
+                <a:latin typeface="+mn-lt"/>
+                <a:ea typeface="+mn-ea"/>
+                <a:cs typeface="+mn-cs"/>
+              </a:defRPr>
+            </a:lvl1pPr>
+            <a:lvl2pPr marL="685800" indent="-228600" algn="l" defTabSz="914400" rtl="0" eaLnBrk="1" latinLnBrk="0" hangingPunct="1">
+              <a:lnSpc>
+                <a:spcPct val="90000"/>
+              </a:lnSpc>
+              <a:spcBef>
+                <a:spcPts val="500"/>
+              </a:spcBef>
+              <a:buFont typeface="Arial" panose="020B0604020202020204" pitchFamily="34" charset="0"/>
+              <a:buChar char="•"/>
+              <a:defRPr sz="2400" kern="1200">
+                <a:solidFill>
+                  <a:schemeClr val="tx1"/>
+                </a:solidFill>
+                <a:latin typeface="+mn-lt"/>
+                <a:ea typeface="+mn-ea"/>
+                <a:cs typeface="+mn-cs"/>
+              </a:defRPr>
+            </a:lvl2pPr>
+            <a:lvl3pPr marL="1143000" indent="-228600" algn="l" defTabSz="914400" rtl="0" eaLnBrk="1" latinLnBrk="0" hangingPunct="1">
+              <a:lnSpc>
+                <a:spcPct val="90000"/>
+              </a:lnSpc>
+              <a:spcBef>
+                <a:spcPts val="500"/>
+              </a:spcBef>
+              <a:buFont typeface="Arial" panose="020B0604020202020204" pitchFamily="34" charset="0"/>
+              <a:buChar char="•"/>
+              <a:defRPr sz="2000" kern="1200">
+                <a:solidFill>
+                  <a:schemeClr val="tx1"/>
+                </a:solidFill>
+                <a:latin typeface="+mn-lt"/>
+                <a:ea typeface="+mn-ea"/>
+                <a:cs typeface="+mn-cs"/>
+              </a:defRPr>
+            </a:lvl3pPr>
+            <a:lvl4pPr marL="1600200" indent="-228600" algn="l" defTabSz="914400" rtl="0" eaLnBrk="1" latinLnBrk="0" hangingPunct="1">
+              <a:lnSpc>
+                <a:spcPct val="90000"/>
+              </a:lnSpc>
+              <a:spcBef>
+                <a:spcPts val="500"/>
+              </a:spcBef>
+              <a:buFont typeface="Arial" panose="020B0604020202020204" pitchFamily="34" charset="0"/>
+              <a:buChar char="•"/>
+              <a:defRPr sz="1800" kern="1200">
+                <a:solidFill>
+                  <a:schemeClr val="tx1"/>
+                </a:solidFill>
+                <a:latin typeface="+mn-lt"/>
+                <a:ea typeface="+mn-ea"/>
+                <a:cs typeface="+mn-cs"/>
+              </a:defRPr>
+            </a:lvl4pPr>
+            <a:lvl5pPr marL="2057400" indent="-228600" algn="l" defTabSz="914400" rtl="0" eaLnBrk="1" latinLnBrk="0" hangingPunct="1">
+              <a:lnSpc>
+                <a:spcPct val="90000"/>
+              </a:lnSpc>
+              <a:spcBef>
+                <a:spcPts val="500"/>
+              </a:spcBef>
+              <a:buFont typeface="Arial" panose="020B0604020202020204" pitchFamily="34" charset="0"/>
+              <a:buChar char="•"/>
+              <a:defRPr sz="1800" kern="1200">
+                <a:solidFill>
+                  <a:schemeClr val="tx1"/>
+                </a:solidFill>
+                <a:latin typeface="+mn-lt"/>
+                <a:ea typeface="+mn-ea"/>
+                <a:cs typeface="+mn-cs"/>
+              </a:defRPr>
+            </a:lvl5pPr>
+            <a:lvl6pPr marL="2514600" indent="-228600" algn="l" defTabSz="914400" rtl="0" eaLnBrk="1" latinLnBrk="0" hangingPunct="1">
+              <a:lnSpc>
+                <a:spcPct val="90000"/>
+              </a:lnSpc>
+              <a:spcBef>
+                <a:spcPts val="500"/>
+              </a:spcBef>
+              <a:buFont typeface="Arial" panose="020B0604020202020204" pitchFamily="34" charset="0"/>
+              <a:buChar char="•"/>
+              <a:defRPr sz="1800" kern="1200">
+                <a:solidFill>
+                  <a:schemeClr val="tx1"/>
+                </a:solidFill>
+                <a:latin typeface="+mn-lt"/>
+                <a:ea typeface="+mn-ea"/>
+                <a:cs typeface="+mn-cs"/>
+              </a:defRPr>
+            </a:lvl6pPr>
+            <a:lvl7pPr marL="2971800" indent="-228600" algn="l" defTabSz="914400" rtl="0" eaLnBrk="1" latinLnBrk="0" hangingPunct="1">
+              <a:lnSpc>
+                <a:spcPct val="90000"/>
+              </a:lnSpc>
+              <a:spcBef>
+                <a:spcPts val="500"/>
+              </a:spcBef>
+              <a:buFont typeface="Arial" panose="020B0604020202020204" pitchFamily="34" charset="0"/>
+              <a:buChar char="•"/>
+              <a:defRPr sz="1800" kern="1200">
+                <a:solidFill>
+                  <a:schemeClr val="tx1"/>
+                </a:solidFill>
+                <a:latin typeface="+mn-lt"/>
+                <a:ea typeface="+mn-ea"/>
+                <a:cs typeface="+mn-cs"/>
+              </a:defRPr>
+            </a:lvl7pPr>
+            <a:lvl8pPr marL="3429000" indent="-228600" algn="l" defTabSz="914400" rtl="0" eaLnBrk="1" latinLnBrk="0" hangingPunct="1">
+              <a:lnSpc>
+                <a:spcPct val="90000"/>
+              </a:lnSpc>
+              <a:spcBef>
+                <a:spcPts val="500"/>
+              </a:spcBef>
+              <a:buFont typeface="Arial" panose="020B0604020202020204" pitchFamily="34" charset="0"/>
+              <a:buChar char="•"/>
+              <a:defRPr sz="1800" kern="1200">
+                <a:solidFill>
+                  <a:schemeClr val="tx1"/>
+                </a:solidFill>
+                <a:latin typeface="+mn-lt"/>
+                <a:ea typeface="+mn-ea"/>
+                <a:cs typeface="+mn-cs"/>
+              </a:defRPr>
+            </a:lvl8pPr>
+            <a:lvl9pPr marL="3886200" indent="-228600" algn="l" defTabSz="914400" rtl="0" eaLnBrk="1" latinLnBrk="0" hangingPunct="1">
+              <a:lnSpc>
+                <a:spcPct val="90000"/>
+              </a:lnSpc>
+              <a:spcBef>
+                <a:spcPts val="500"/>
+              </a:spcBef>
+              <a:buFont typeface="Arial" panose="020B0604020202020204" pitchFamily="34" charset="0"/>
+              <a:buChar char="•"/>
+              <a:defRPr sz="1800" kern="1200">
+                <a:solidFill>
+                  <a:schemeClr val="tx1"/>
+                </a:solidFill>
+                <a:latin typeface="+mn-lt"/>
+                <a:ea typeface="+mn-ea"/>
+                <a:cs typeface="+mn-cs"/>
+              </a:defRPr>
+            </a:lvl9pPr>
+          </a:lstStyle>
+          <a:p>
+            <a:pPr marL="0" indent="0">
+              <a:buFont typeface="Arial" panose="020B0604020202020204" pitchFamily="34" charset="0"/>
+              <a:buNone/>
+            </a:pPr>
+            <a:r>
+              <a:rPr lang="fr-FR" dirty="0"/>
+              <a:t>Solution </a:t>
+            </a:r>
+            <a:r>
+              <a:rPr lang="fr-FR" dirty="0">
+                <a:sym typeface="Wingdings" panose="05000000000000000000" pitchFamily="2" charset="2"/>
+              </a:rPr>
+              <a:t> Value Object</a:t>
+            </a:r>
+            <a:r>
+              <a:rPr lang="fr-FR" dirty="0"/>
+              <a:t> </a:t>
+            </a:r>
+          </a:p>
+          <a:p>
+            <a:pPr lvl="1"/>
+            <a:r>
+              <a:rPr lang="fr-FR" dirty="0"/>
+              <a:t>Immuable</a:t>
+            </a:r>
+          </a:p>
+          <a:p>
+            <a:pPr lvl="1"/>
+            <a:r>
+              <a:rPr lang="fr-FR" dirty="0"/>
+              <a:t>A un sens métier explicite</a:t>
+            </a:r>
+          </a:p>
+          <a:p>
+            <a:pPr lvl="1"/>
+            <a:r>
+              <a:rPr lang="fr-FR" dirty="0"/>
+              <a:t>L'égalité se base sur les valeurs</a:t>
+            </a:r>
+          </a:p>
+          <a:p>
+            <a:pPr lvl="1"/>
+            <a:r>
+              <a:rPr lang="fr-FR" dirty="0"/>
+              <a:t>Centralise les règles de validation</a:t>
+            </a:r>
+          </a:p>
+          <a:p>
+            <a:pPr lvl="1"/>
+            <a:r>
+              <a:rPr lang="fr-FR" dirty="0"/>
+              <a:t>Encapsule une valeur ou un groupe de valeurs</a:t>
+            </a:r>
+          </a:p>
+          <a:p>
+            <a:pPr lvl="1"/>
+            <a:endParaRPr lang="fr-FR" dirty="0"/>
+          </a:p>
+        </p:txBody>
+      </p:sp>
+    </p:spTree>
+    <p:extLst>
+      <p:ext uri="{BB962C8B-B14F-4D97-AF65-F5344CB8AC3E}">
+        <p14:creationId xmlns:p14="http://schemas.microsoft.com/office/powerpoint/2010/main" val="162687470"/>
+      </p:ext>
+    </p:extLst>
+  </p:cSld>
+  <p:clrMapOvr>
+    <a:masterClrMapping/>
+  </p:clrMapOvr>
+</p:sld>
+</file>
+
+<file path=ppt/slides/slide6.xml><?xml version="1.0" encoding="utf-8"?>
+<p:sld xmlns:a="http://schemas.openxmlformats.org/drawingml/2006/main" xmlns:r="http://schemas.openxmlformats.org/officeDocument/2006/relationships" xmlns:p="http://schemas.openxmlformats.org/presentationml/2006/main">
+  <p:cSld>
+    <p:spTree>
+      <p:nvGrpSpPr>
+        <p:cNvPr id="1" name=""/>
+        <p:cNvGrpSpPr/>
+        <p:nvPr/>
+      </p:nvGrpSpPr>
+      <p:grpSpPr>
+        <a:xfrm>
+          <a:off x="0" y="0"/>
+          <a:ext cx="0" cy="0"/>
+          <a:chOff x="0" y="0"/>
+          <a:chExt cx="0" cy="0"/>
+        </a:xfrm>
+      </p:grpSpPr>
+      <p:sp>
+        <p:nvSpPr>
+          <p:cNvPr id="2" name="Titre 1">
+            <a:extLst>
+              <a:ext uri="{FF2B5EF4-FFF2-40B4-BE49-F238E27FC236}">
+                <a16:creationId xmlns:a16="http://schemas.microsoft.com/office/drawing/2014/main" id="{DF4B1092-F48A-459F-E068-EC00EA7A0579}"/>
+              </a:ext>
+            </a:extLst>
+          </p:cNvPr>
+          <p:cNvSpPr>
+            <a:spLocks noGrp="1"/>
+          </p:cNvSpPr>
+          <p:nvPr>
+            <p:ph type="title"/>
+          </p:nvPr>
+        </p:nvSpPr>
+        <p:spPr/>
+        <p:txBody>
+          <a:bodyPr/>
+          <a:lstStyle/>
+          <a:p>
+            <a:r>
+              <a:rPr lang="fr-FR" dirty="0"/>
+              <a:t>Patterns de création d’objet</a:t>
+            </a:r>
+          </a:p>
+        </p:txBody>
+      </p:sp>
+      <p:sp>
+        <p:nvSpPr>
+          <p:cNvPr id="3" name="Espace réservé du contenu 2">
+            <a:extLst>
+              <a:ext uri="{FF2B5EF4-FFF2-40B4-BE49-F238E27FC236}">
+                <a16:creationId xmlns:a16="http://schemas.microsoft.com/office/drawing/2014/main" id="{571B8028-1EC2-ABC9-EF45-3CD600B317B4}"/>
+              </a:ext>
+            </a:extLst>
+          </p:cNvPr>
+          <p:cNvSpPr>
+            <a:spLocks noGrp="1"/>
+          </p:cNvSpPr>
+          <p:nvPr>
+            <p:ph idx="1"/>
+          </p:nvPr>
+        </p:nvSpPr>
+        <p:spPr>
+          <a:xfrm>
+            <a:off x="447583" y="1585975"/>
+            <a:ext cx="5648417" cy="2622041"/>
+          </a:xfrm>
+        </p:spPr>
+        <p:txBody>
+          <a:bodyPr>
+            <a:normAutofit fontScale="92500" lnSpcReduction="10000"/>
+          </a:bodyPr>
+          <a:lstStyle/>
+          <a:p>
+            <a:pPr marL="0" indent="0">
+              <a:buNone/>
+            </a:pPr>
+            <a:r>
+              <a:rPr lang="fr-FR" b="1" dirty="0" err="1"/>
+              <a:t>Static</a:t>
+            </a:r>
+            <a:r>
+              <a:rPr lang="fr-FR" b="1" dirty="0"/>
+              <a:t> Builder</a:t>
+            </a:r>
+          </a:p>
+          <a:p>
+            <a:pPr lvl="1"/>
+            <a:r>
+              <a:rPr lang="fr-FR" dirty="0"/>
+              <a:t>Construire un objet complexe étape par étape</a:t>
+            </a:r>
+          </a:p>
+          <a:p>
+            <a:pPr lvl="1"/>
+            <a:r>
+              <a:rPr lang="fr-FR" dirty="0"/>
+              <a:t>Valider les règles métiers en construction</a:t>
+            </a:r>
+          </a:p>
+          <a:p>
+            <a:pPr lvl="1"/>
+            <a:r>
+              <a:rPr lang="fr-FR" dirty="0"/>
+              <a:t>Eviter d’avoir 10 </a:t>
+            </a:r>
+            <a:r>
+              <a:rPr lang="fr-FR" dirty="0" err="1"/>
+              <a:t>overloads</a:t>
+            </a:r>
+            <a:r>
+              <a:rPr lang="fr-FR" dirty="0"/>
+              <a:t> de constructeur</a:t>
+            </a:r>
+          </a:p>
+          <a:p>
+            <a:pPr lvl="1"/>
+            <a:r>
+              <a:rPr lang="fr-FR" dirty="0"/>
+              <a:t>Forcer certains paramètres obligatoires</a:t>
+            </a:r>
+          </a:p>
+          <a:p>
+            <a:pPr lvl="1"/>
+            <a:r>
+              <a:rPr lang="fr-FR" dirty="0"/>
+              <a:t>Rendre le code plus lisible et évolutif</a:t>
+            </a:r>
+          </a:p>
+        </p:txBody>
+      </p:sp>
+      <p:sp>
+        <p:nvSpPr>
+          <p:cNvPr id="4" name="Espace réservé du contenu 2">
+            <a:extLst>
+              <a:ext uri="{FF2B5EF4-FFF2-40B4-BE49-F238E27FC236}">
+                <a16:creationId xmlns:a16="http://schemas.microsoft.com/office/drawing/2014/main" id="{5C60F250-8513-FE8E-A6E0-F1A75CD4A400}"/>
+              </a:ext>
+            </a:extLst>
+          </p:cNvPr>
+          <p:cNvSpPr txBox="1">
+            <a:spLocks/>
+          </p:cNvSpPr>
+          <p:nvPr/>
+        </p:nvSpPr>
+        <p:spPr>
+          <a:xfrm>
+            <a:off x="6096000" y="1585975"/>
+            <a:ext cx="5648416" cy="2622041"/>
+          </a:xfrm>
+          <a:prstGeom prst="rect">
+            <a:avLst/>
+          </a:prstGeom>
+        </p:spPr>
+        <p:txBody>
+          <a:bodyPr vert="horz" lIns="91440" tIns="45720" rIns="91440" bIns="45720" rtlCol="0">
+            <a:normAutofit/>
+          </a:bodyPr>
+          <a:lstStyle>
+            <a:lvl1pPr marL="228600" indent="-228600" algn="l" defTabSz="914400" rtl="0" eaLnBrk="1" latinLnBrk="0" hangingPunct="1">
+              <a:lnSpc>
+                <a:spcPct val="90000"/>
+              </a:lnSpc>
+              <a:spcBef>
+                <a:spcPts val="1000"/>
+              </a:spcBef>
+              <a:buFont typeface="Arial" panose="020B0604020202020204" pitchFamily="34" charset="0"/>
+              <a:buChar char="•"/>
+              <a:defRPr sz="2800" kern="1200">
+                <a:solidFill>
+                  <a:schemeClr val="tx1"/>
+                </a:solidFill>
+                <a:latin typeface="+mn-lt"/>
+                <a:ea typeface="+mn-ea"/>
+                <a:cs typeface="+mn-cs"/>
+              </a:defRPr>
+            </a:lvl1pPr>
+            <a:lvl2pPr marL="685800" indent="-228600" algn="l" defTabSz="914400" rtl="0" eaLnBrk="1" latinLnBrk="0" hangingPunct="1">
+              <a:lnSpc>
+                <a:spcPct val="90000"/>
+              </a:lnSpc>
+              <a:spcBef>
+                <a:spcPts val="500"/>
+              </a:spcBef>
+              <a:buFont typeface="Arial" panose="020B0604020202020204" pitchFamily="34" charset="0"/>
+              <a:buChar char="•"/>
+              <a:defRPr sz="2400" kern="1200">
+                <a:solidFill>
+                  <a:schemeClr val="tx1"/>
+                </a:solidFill>
+                <a:latin typeface="+mn-lt"/>
+                <a:ea typeface="+mn-ea"/>
+                <a:cs typeface="+mn-cs"/>
+              </a:defRPr>
+            </a:lvl2pPr>
+            <a:lvl3pPr marL="1143000" indent="-228600" algn="l" defTabSz="914400" rtl="0" eaLnBrk="1" latinLnBrk="0" hangingPunct="1">
+              <a:lnSpc>
+                <a:spcPct val="90000"/>
+              </a:lnSpc>
+              <a:spcBef>
+                <a:spcPts val="500"/>
+              </a:spcBef>
+              <a:buFont typeface="Arial" panose="020B0604020202020204" pitchFamily="34" charset="0"/>
+              <a:buChar char="•"/>
+              <a:defRPr sz="2000" kern="1200">
+                <a:solidFill>
+                  <a:schemeClr val="tx1"/>
+                </a:solidFill>
+                <a:latin typeface="+mn-lt"/>
+                <a:ea typeface="+mn-ea"/>
+                <a:cs typeface="+mn-cs"/>
+              </a:defRPr>
+            </a:lvl3pPr>
+            <a:lvl4pPr marL="1600200" indent="-228600" algn="l" defTabSz="914400" rtl="0" eaLnBrk="1" latinLnBrk="0" hangingPunct="1">
+              <a:lnSpc>
+                <a:spcPct val="90000"/>
+              </a:lnSpc>
+              <a:spcBef>
+                <a:spcPts val="500"/>
+              </a:spcBef>
+              <a:buFont typeface="Arial" panose="020B0604020202020204" pitchFamily="34" charset="0"/>
+              <a:buChar char="•"/>
+              <a:defRPr sz="1800" kern="1200">
+                <a:solidFill>
+                  <a:schemeClr val="tx1"/>
+                </a:solidFill>
+                <a:latin typeface="+mn-lt"/>
+                <a:ea typeface="+mn-ea"/>
+                <a:cs typeface="+mn-cs"/>
+              </a:defRPr>
+            </a:lvl4pPr>
+            <a:lvl5pPr marL="2057400" indent="-228600" algn="l" defTabSz="914400" rtl="0" eaLnBrk="1" latinLnBrk="0" hangingPunct="1">
+              <a:lnSpc>
+                <a:spcPct val="90000"/>
+              </a:lnSpc>
+              <a:spcBef>
+                <a:spcPts val="500"/>
+              </a:spcBef>
+              <a:buFont typeface="Arial" panose="020B0604020202020204" pitchFamily="34" charset="0"/>
+              <a:buChar char="•"/>
+              <a:defRPr sz="1800" kern="1200">
+                <a:solidFill>
+                  <a:schemeClr val="tx1"/>
+                </a:solidFill>
+                <a:latin typeface="+mn-lt"/>
+                <a:ea typeface="+mn-ea"/>
+                <a:cs typeface="+mn-cs"/>
+              </a:defRPr>
+            </a:lvl5pPr>
+            <a:lvl6pPr marL="2514600" indent="-228600" algn="l" defTabSz="914400" rtl="0" eaLnBrk="1" latinLnBrk="0" hangingPunct="1">
+              <a:lnSpc>
+                <a:spcPct val="90000"/>
+              </a:lnSpc>
+              <a:spcBef>
+                <a:spcPts val="500"/>
+              </a:spcBef>
+              <a:buFont typeface="Arial" panose="020B0604020202020204" pitchFamily="34" charset="0"/>
+              <a:buChar char="•"/>
+              <a:defRPr sz="1800" kern="1200">
+                <a:solidFill>
+                  <a:schemeClr val="tx1"/>
+                </a:solidFill>
+                <a:latin typeface="+mn-lt"/>
+                <a:ea typeface="+mn-ea"/>
+                <a:cs typeface="+mn-cs"/>
+              </a:defRPr>
+            </a:lvl6pPr>
+            <a:lvl7pPr marL="2971800" indent="-228600" algn="l" defTabSz="914400" rtl="0" eaLnBrk="1" latinLnBrk="0" hangingPunct="1">
+              <a:lnSpc>
+                <a:spcPct val="90000"/>
+              </a:lnSpc>
+              <a:spcBef>
+                <a:spcPts val="500"/>
+              </a:spcBef>
+              <a:buFont typeface="Arial" panose="020B0604020202020204" pitchFamily="34" charset="0"/>
+              <a:buChar char="•"/>
+              <a:defRPr sz="1800" kern="1200">
+                <a:solidFill>
+                  <a:schemeClr val="tx1"/>
+                </a:solidFill>
+                <a:latin typeface="+mn-lt"/>
+                <a:ea typeface="+mn-ea"/>
+                <a:cs typeface="+mn-cs"/>
+              </a:defRPr>
+            </a:lvl7pPr>
+            <a:lvl8pPr marL="3429000" indent="-228600" algn="l" defTabSz="914400" rtl="0" eaLnBrk="1" latinLnBrk="0" hangingPunct="1">
+              <a:lnSpc>
+                <a:spcPct val="90000"/>
+              </a:lnSpc>
+              <a:spcBef>
+                <a:spcPts val="500"/>
+              </a:spcBef>
+              <a:buFont typeface="Arial" panose="020B0604020202020204" pitchFamily="34" charset="0"/>
+              <a:buChar char="•"/>
+              <a:defRPr sz="1800" kern="1200">
+                <a:solidFill>
+                  <a:schemeClr val="tx1"/>
+                </a:solidFill>
+                <a:latin typeface="+mn-lt"/>
+                <a:ea typeface="+mn-ea"/>
+                <a:cs typeface="+mn-cs"/>
+              </a:defRPr>
+            </a:lvl8pPr>
+            <a:lvl9pPr marL="3886200" indent="-228600" algn="l" defTabSz="914400" rtl="0" eaLnBrk="1" latinLnBrk="0" hangingPunct="1">
+              <a:lnSpc>
+                <a:spcPct val="90000"/>
+              </a:lnSpc>
+              <a:spcBef>
+                <a:spcPts val="500"/>
+              </a:spcBef>
+              <a:buFont typeface="Arial" panose="020B0604020202020204" pitchFamily="34" charset="0"/>
+              <a:buChar char="•"/>
+              <a:defRPr sz="1800" kern="1200">
+                <a:solidFill>
+                  <a:schemeClr val="tx1"/>
+                </a:solidFill>
+                <a:latin typeface="+mn-lt"/>
+                <a:ea typeface="+mn-ea"/>
+                <a:cs typeface="+mn-cs"/>
+              </a:defRPr>
+            </a:lvl9pPr>
+          </a:lstStyle>
+          <a:p>
+            <a:pPr marL="0" indent="0">
+              <a:buFont typeface="Arial" panose="020B0604020202020204" pitchFamily="34" charset="0"/>
+              <a:buNone/>
+            </a:pPr>
+            <a:r>
+              <a:rPr lang="fr-FR" b="1" dirty="0" err="1"/>
+              <a:t>Factory</a:t>
+            </a:r>
+            <a:r>
+              <a:rPr lang="fr-FR" b="1" dirty="0"/>
+              <a:t> Method </a:t>
+            </a:r>
+            <a:r>
+              <a:rPr lang="fr-FR" dirty="0"/>
+              <a:t>(C#-</a:t>
+            </a:r>
+            <a:r>
+              <a:rPr lang="fr-FR" dirty="0" err="1"/>
+              <a:t>friendly</a:t>
+            </a:r>
+            <a:r>
+              <a:rPr lang="fr-FR" dirty="0"/>
+              <a:t>)</a:t>
+            </a:r>
+          </a:p>
+          <a:p>
+            <a:pPr lvl="1"/>
+            <a:r>
+              <a:rPr lang="fr-FR" dirty="0"/>
+              <a:t>Un constructeur </a:t>
+            </a:r>
+            <a:r>
+              <a:rPr lang="fr-FR" dirty="0" err="1"/>
+              <a:t>private</a:t>
+            </a:r>
+            <a:r>
+              <a:rPr lang="fr-FR" dirty="0"/>
+              <a:t> pour forcer le contrôle sur la construction et des méthodes </a:t>
+            </a:r>
+            <a:r>
+              <a:rPr lang="fr-FR" dirty="0" err="1"/>
+              <a:t>static</a:t>
+            </a:r>
+            <a:r>
+              <a:rPr lang="fr-FR" dirty="0"/>
+              <a:t> public qui représentent des « constructeurs métier »</a:t>
+            </a:r>
+          </a:p>
+        </p:txBody>
+      </p:sp>
+      <p:sp>
+        <p:nvSpPr>
+          <p:cNvPr id="6" name="Espace réservé du contenu 2">
+            <a:extLst>
+              <a:ext uri="{FF2B5EF4-FFF2-40B4-BE49-F238E27FC236}">
+                <a16:creationId xmlns:a16="http://schemas.microsoft.com/office/drawing/2014/main" id="{FA1BEA47-A5D2-2971-F287-B819461D1887}"/>
+              </a:ext>
+            </a:extLst>
+          </p:cNvPr>
+          <p:cNvSpPr txBox="1">
+            <a:spLocks/>
+          </p:cNvSpPr>
+          <p:nvPr/>
+        </p:nvSpPr>
+        <p:spPr>
+          <a:xfrm>
+            <a:off x="447583" y="4376739"/>
+            <a:ext cx="11296833" cy="2116136"/>
+          </a:xfrm>
+          <a:prstGeom prst="rect">
+            <a:avLst/>
+          </a:prstGeom>
+        </p:spPr>
+        <p:txBody>
+          <a:bodyPr vert="horz" lIns="91440" tIns="45720" rIns="91440" bIns="45720" rtlCol="0">
             <a:normAutofit lnSpcReduction="10000"/>
           </a:bodyPr>
           <a:lstStyle>
@@ -5350,58 +5988,42 @@
               <a:buNone/>
             </a:pPr>
             <a:r>
+              <a:rPr lang="fr-FR" b="1" dirty="0"/>
+              <a:t>Cas d’utilisation</a:t>
+            </a:r>
+          </a:p>
+          <a:p>
+            <a:pPr marL="0" indent="0">
+              <a:buNone/>
+            </a:pPr>
+            <a:r>
+              <a:rPr lang="fr-FR" dirty="0" err="1"/>
+              <a:t>Static</a:t>
+            </a:r>
+            <a:r>
               <a:rPr lang="fr-FR" dirty="0"/>
-              <a:t>Solution </a:t>
-            </a:r>
-            <a:r>
-              <a:rPr lang="fr-FR" dirty="0">
-                <a:sym typeface="Wingdings" panose="05000000000000000000" pitchFamily="2" charset="2"/>
-              </a:rPr>
-              <a:t> Value Object</a:t>
+              <a:t> Builder : pour les objets complexes avec beaucoup d’options et d’ordre logique à respecter. Permet de rendre la construction flexible et progressive.</a:t>
+            </a:r>
+          </a:p>
+          <a:p>
+            <a:pPr marL="0" indent="0">
+              <a:buNone/>
+            </a:pPr>
+            <a:r>
+              <a:rPr lang="fr-FR" dirty="0" err="1"/>
+              <a:t>Factory</a:t>
             </a:r>
             <a:r>
               <a:rPr lang="fr-FR" dirty="0"/>
-              <a:t> </a:t>
-            </a:r>
-          </a:p>
-          <a:p>
-            <a:pPr lvl="1"/>
-            <a:r>
-              <a:rPr lang="fr-FR" dirty="0"/>
-              <a:t>Immuable</a:t>
-            </a:r>
-          </a:p>
-          <a:p>
-            <a:pPr lvl="1"/>
-            <a:r>
-              <a:rPr lang="fr-FR" dirty="0"/>
-              <a:t>A un sens métier explicite</a:t>
-            </a:r>
-          </a:p>
-          <a:p>
-            <a:pPr lvl="1"/>
-            <a:r>
-              <a:rPr lang="fr-FR" dirty="0"/>
-              <a:t>L'égalité se base sur les valeurs</a:t>
-            </a:r>
-          </a:p>
-          <a:p>
-            <a:pPr lvl="1"/>
-            <a:r>
-              <a:rPr lang="fr-FR" dirty="0"/>
-              <a:t>Encapsule une valeur ou un groupe de valeurs</a:t>
-            </a:r>
-          </a:p>
-          <a:p>
-            <a:pPr lvl="1"/>
-            <a:endParaRPr lang="fr-FR" dirty="0"/>
+              <a:t> Method : Pour les objets simples à moyens. Permet de forcer un "scénario métier" clair.</a:t>
+            </a:r>
           </a:p>
         </p:txBody>
       </p:sp>
     </p:spTree>
     <p:extLst>
       <p:ext uri="{BB962C8B-B14F-4D97-AF65-F5344CB8AC3E}">
-        <p14:creationId xmlns:p14="http://schemas.microsoft.com/office/powerpoint/2010/main" val="162687470"/>
+        <p14:creationId xmlns:p14="http://schemas.microsoft.com/office/powerpoint/2010/main" val="2828245373"/>
       </p:ext>
     </p:extLst>
   </p:cSld>

</xml_diff>

<commit_message>
Change Objects to immutable
</commit_message>
<xml_diff>
--- a/Elegant_Objects.pptx
+++ b/Elegant_Objects.pptx
@@ -11,6 +11,7 @@
     <p:sldId id="259" r:id="rId5"/>
     <p:sldId id="260" r:id="rId6"/>
     <p:sldId id="261" r:id="rId7"/>
+    <p:sldId id="262" r:id="rId8"/>
   </p:sldIdLst>
   <p:sldSz cx="12192000" cy="6858000"/>
   <p:notesSz cx="6858000" cy="9144000"/>
@@ -264,7 +265,7 @@
           <a:p>
             <a:fld id="{CF2ECFED-0AE4-4F4D-9F93-28B3B5AEC0C8}" type="datetimeFigureOut">
               <a:rPr lang="fr-FR" smtClean="0"/>
-              <a:t>10/06/2025</a:t>
+              <a:t>11/06/2025</a:t>
             </a:fld>
             <a:endParaRPr lang="fr-FR"/>
           </a:p>
@@ -462,7 +463,7 @@
           <a:p>
             <a:fld id="{CF2ECFED-0AE4-4F4D-9F93-28B3B5AEC0C8}" type="datetimeFigureOut">
               <a:rPr lang="fr-FR" smtClean="0"/>
-              <a:t>10/06/2025</a:t>
+              <a:t>11/06/2025</a:t>
             </a:fld>
             <a:endParaRPr lang="fr-FR"/>
           </a:p>
@@ -670,7 +671,7 @@
           <a:p>
             <a:fld id="{CF2ECFED-0AE4-4F4D-9F93-28B3B5AEC0C8}" type="datetimeFigureOut">
               <a:rPr lang="fr-FR" smtClean="0"/>
-              <a:t>10/06/2025</a:t>
+              <a:t>11/06/2025</a:t>
             </a:fld>
             <a:endParaRPr lang="fr-FR"/>
           </a:p>
@@ -868,7 +869,7 @@
           <a:p>
             <a:fld id="{CF2ECFED-0AE4-4F4D-9F93-28B3B5AEC0C8}" type="datetimeFigureOut">
               <a:rPr lang="fr-FR" smtClean="0"/>
-              <a:t>10/06/2025</a:t>
+              <a:t>11/06/2025</a:t>
             </a:fld>
             <a:endParaRPr lang="fr-FR"/>
           </a:p>
@@ -1143,7 +1144,7 @@
           <a:p>
             <a:fld id="{CF2ECFED-0AE4-4F4D-9F93-28B3B5AEC0C8}" type="datetimeFigureOut">
               <a:rPr lang="fr-FR" smtClean="0"/>
-              <a:t>10/06/2025</a:t>
+              <a:t>11/06/2025</a:t>
             </a:fld>
             <a:endParaRPr lang="fr-FR"/>
           </a:p>
@@ -1408,7 +1409,7 @@
           <a:p>
             <a:fld id="{CF2ECFED-0AE4-4F4D-9F93-28B3B5AEC0C8}" type="datetimeFigureOut">
               <a:rPr lang="fr-FR" smtClean="0"/>
-              <a:t>10/06/2025</a:t>
+              <a:t>11/06/2025</a:t>
             </a:fld>
             <a:endParaRPr lang="fr-FR"/>
           </a:p>
@@ -1820,7 +1821,7 @@
           <a:p>
             <a:fld id="{CF2ECFED-0AE4-4F4D-9F93-28B3B5AEC0C8}" type="datetimeFigureOut">
               <a:rPr lang="fr-FR" smtClean="0"/>
-              <a:t>10/06/2025</a:t>
+              <a:t>11/06/2025</a:t>
             </a:fld>
             <a:endParaRPr lang="fr-FR"/>
           </a:p>
@@ -1961,7 +1962,7 @@
           <a:p>
             <a:fld id="{CF2ECFED-0AE4-4F4D-9F93-28B3B5AEC0C8}" type="datetimeFigureOut">
               <a:rPr lang="fr-FR" smtClean="0"/>
-              <a:t>10/06/2025</a:t>
+              <a:t>11/06/2025</a:t>
             </a:fld>
             <a:endParaRPr lang="fr-FR"/>
           </a:p>
@@ -2074,7 +2075,7 @@
           <a:p>
             <a:fld id="{CF2ECFED-0AE4-4F4D-9F93-28B3B5AEC0C8}" type="datetimeFigureOut">
               <a:rPr lang="fr-FR" smtClean="0"/>
-              <a:t>10/06/2025</a:t>
+              <a:t>11/06/2025</a:t>
             </a:fld>
             <a:endParaRPr lang="fr-FR"/>
           </a:p>
@@ -2385,7 +2386,7 @@
           <a:p>
             <a:fld id="{CF2ECFED-0AE4-4F4D-9F93-28B3B5AEC0C8}" type="datetimeFigureOut">
               <a:rPr lang="fr-FR" smtClean="0"/>
-              <a:t>10/06/2025</a:t>
+              <a:t>11/06/2025</a:t>
             </a:fld>
             <a:endParaRPr lang="fr-FR"/>
           </a:p>
@@ -2673,7 +2674,7 @@
           <a:p>
             <a:fld id="{CF2ECFED-0AE4-4F4D-9F93-28B3B5AEC0C8}" type="datetimeFigureOut">
               <a:rPr lang="fr-FR" smtClean="0"/>
-              <a:t>10/06/2025</a:t>
+              <a:t>11/06/2025</a:t>
             </a:fld>
             <a:endParaRPr lang="fr-FR"/>
           </a:p>
@@ -2914,7 +2915,7 @@
           <a:p>
             <a:fld id="{CF2ECFED-0AE4-4F4D-9F93-28B3B5AEC0C8}" type="datetimeFigureOut">
               <a:rPr lang="fr-FR" smtClean="0"/>
-              <a:t>10/06/2025</a:t>
+              <a:t>11/06/2025</a:t>
             </a:fld>
             <a:endParaRPr lang="fr-FR"/>
           </a:p>
@@ -4811,6 +4812,45 @@
           </a:p>
         </p:txBody>
       </p:sp>
+      <p:sp>
+        <p:nvSpPr>
+          <p:cNvPr id="4" name="ZoneTexte 3">
+            <a:extLst>
+              <a:ext uri="{FF2B5EF4-FFF2-40B4-BE49-F238E27FC236}">
+                <a16:creationId xmlns:a16="http://schemas.microsoft.com/office/drawing/2014/main" id="{B61DAAFF-6901-8647-E848-DB14DEA36D8B}"/>
+              </a:ext>
+            </a:extLst>
+          </p:cNvPr>
+          <p:cNvSpPr txBox="1"/>
+          <p:nvPr/>
+        </p:nvSpPr>
+        <p:spPr>
+          <a:xfrm>
+            <a:off x="10122876" y="1097657"/>
+            <a:ext cx="643125" cy="369332"/>
+          </a:xfrm>
+          <a:prstGeom prst="rect">
+            <a:avLst/>
+          </a:prstGeom>
+          <a:noFill/>
+        </p:spPr>
+        <p:txBody>
+          <a:bodyPr wrap="none" rtlCol="0">
+            <a:spAutoFit/>
+          </a:bodyPr>
+          <a:lstStyle/>
+          <a:p>
+            <a:r>
+              <a:rPr lang="fr-FR" i="1" dirty="0">
+                <a:solidFill>
+                  <a:schemeClr val="accent6"/>
+                </a:solidFill>
+              </a:rPr>
+              <a:t>#null</a:t>
+            </a:r>
+          </a:p>
+        </p:txBody>
+      </p:sp>
     </p:spTree>
     <p:extLst>
       <p:ext uri="{BB962C8B-B14F-4D97-AF65-F5344CB8AC3E}">
@@ -5029,6 +5069,45 @@
           </a:p>
           <a:p>
             <a:endParaRPr lang="fr-FR" dirty="0"/>
+          </a:p>
+        </p:txBody>
+      </p:sp>
+      <p:sp>
+        <p:nvSpPr>
+          <p:cNvPr id="4" name="ZoneTexte 3">
+            <a:extLst>
+              <a:ext uri="{FF2B5EF4-FFF2-40B4-BE49-F238E27FC236}">
+                <a16:creationId xmlns:a16="http://schemas.microsoft.com/office/drawing/2014/main" id="{20323C9A-ED3F-306C-E54D-255E067428C7}"/>
+              </a:ext>
+            </a:extLst>
+          </p:cNvPr>
+          <p:cNvSpPr txBox="1"/>
+          <p:nvPr/>
+        </p:nvSpPr>
+        <p:spPr>
+          <a:xfrm>
+            <a:off x="10122876" y="1097657"/>
+            <a:ext cx="643125" cy="369332"/>
+          </a:xfrm>
+          <a:prstGeom prst="rect">
+            <a:avLst/>
+          </a:prstGeom>
+          <a:noFill/>
+        </p:spPr>
+        <p:txBody>
+          <a:bodyPr wrap="none" rtlCol="0">
+            <a:spAutoFit/>
+          </a:bodyPr>
+          <a:lstStyle/>
+          <a:p>
+            <a:r>
+              <a:rPr lang="fr-FR" i="1" dirty="0">
+                <a:solidFill>
+                  <a:schemeClr val="accent6"/>
+                </a:solidFill>
+              </a:rPr>
+              <a:t>#null</a:t>
+            </a:r>
           </a:p>
         </p:txBody>
       </p:sp>
@@ -5406,6 +5485,45 @@
           </a:p>
         </p:txBody>
       </p:sp>
+      <p:sp>
+        <p:nvSpPr>
+          <p:cNvPr id="5" name="ZoneTexte 4">
+            <a:extLst>
+              <a:ext uri="{FF2B5EF4-FFF2-40B4-BE49-F238E27FC236}">
+                <a16:creationId xmlns:a16="http://schemas.microsoft.com/office/drawing/2014/main" id="{881F0460-6C8C-78B3-7807-CBADF3FC4CE3}"/>
+              </a:ext>
+            </a:extLst>
+          </p:cNvPr>
+          <p:cNvSpPr txBox="1"/>
+          <p:nvPr/>
+        </p:nvSpPr>
+        <p:spPr>
+          <a:xfrm>
+            <a:off x="10007466" y="365125"/>
+            <a:ext cx="1449436" cy="369332"/>
+          </a:xfrm>
+          <a:prstGeom prst="rect">
+            <a:avLst/>
+          </a:prstGeom>
+          <a:noFill/>
+        </p:spPr>
+        <p:txBody>
+          <a:bodyPr wrap="none" rtlCol="0">
+            <a:spAutoFit/>
+          </a:bodyPr>
+          <a:lstStyle/>
+          <a:p>
+            <a:r>
+              <a:rPr lang="fr-FR" i="1" dirty="0">
+                <a:solidFill>
+                  <a:schemeClr val="accent6"/>
+                </a:solidFill>
+              </a:rPr>
+              <a:t>#value-object</a:t>
+            </a:r>
+          </a:p>
+        </p:txBody>
+      </p:sp>
     </p:spTree>
     <p:extLst>
       <p:ext uri="{BB962C8B-B14F-4D97-AF65-F5344CB8AC3E}">
@@ -6020,10 +6138,970 @@
           </a:p>
         </p:txBody>
       </p:sp>
+      <p:sp>
+        <p:nvSpPr>
+          <p:cNvPr id="5" name="ZoneTexte 4">
+            <a:extLst>
+              <a:ext uri="{FF2B5EF4-FFF2-40B4-BE49-F238E27FC236}">
+                <a16:creationId xmlns:a16="http://schemas.microsoft.com/office/drawing/2014/main" id="{9C5E26FC-30DB-989C-B0D9-6453BC1C02BD}"/>
+              </a:ext>
+            </a:extLst>
+          </p:cNvPr>
+          <p:cNvSpPr txBox="1"/>
+          <p:nvPr/>
+        </p:nvSpPr>
+        <p:spPr>
+          <a:xfrm>
+            <a:off x="10007466" y="365125"/>
+            <a:ext cx="1360372" cy="369332"/>
+          </a:xfrm>
+          <a:prstGeom prst="rect">
+            <a:avLst/>
+          </a:prstGeom>
+          <a:noFill/>
+        </p:spPr>
+        <p:txBody>
+          <a:bodyPr wrap="none" rtlCol="0">
+            <a:spAutoFit/>
+          </a:bodyPr>
+          <a:lstStyle/>
+          <a:p>
+            <a:r>
+              <a:rPr lang="fr-FR" i="1" dirty="0">
+                <a:solidFill>
+                  <a:schemeClr val="accent6"/>
+                </a:solidFill>
+              </a:rPr>
+              <a:t>#constructor</a:t>
+            </a:r>
+          </a:p>
+        </p:txBody>
+      </p:sp>
     </p:spTree>
     <p:extLst>
       <p:ext uri="{BB962C8B-B14F-4D97-AF65-F5344CB8AC3E}">
         <p14:creationId xmlns:p14="http://schemas.microsoft.com/office/powerpoint/2010/main" val="2828245373"/>
+      </p:ext>
+    </p:extLst>
+  </p:cSld>
+  <p:clrMapOvr>
+    <a:masterClrMapping/>
+  </p:clrMapOvr>
+</p:sld>
+</file>
+
+<file path=ppt/slides/slide7.xml><?xml version="1.0" encoding="utf-8"?>
+<p:sld xmlns:a="http://schemas.openxmlformats.org/drawingml/2006/main" xmlns:r="http://schemas.openxmlformats.org/officeDocument/2006/relationships" xmlns:p="http://schemas.openxmlformats.org/presentationml/2006/main">
+  <p:cSld>
+    <p:spTree>
+      <p:nvGrpSpPr>
+        <p:cNvPr id="1" name=""/>
+        <p:cNvGrpSpPr/>
+        <p:nvPr/>
+      </p:nvGrpSpPr>
+      <p:grpSpPr>
+        <a:xfrm>
+          <a:off x="0" y="0"/>
+          <a:ext cx="0" cy="0"/>
+          <a:chOff x="0" y="0"/>
+          <a:chExt cx="0" cy="0"/>
+        </a:xfrm>
+      </p:grpSpPr>
+      <p:sp>
+        <p:nvSpPr>
+          <p:cNvPr id="2" name="Titre 1">
+            <a:extLst>
+              <a:ext uri="{FF2B5EF4-FFF2-40B4-BE49-F238E27FC236}">
+                <a16:creationId xmlns:a16="http://schemas.microsoft.com/office/drawing/2014/main" id="{1EFA1BBF-4623-835D-4FEC-80043ABE8A1B}"/>
+              </a:ext>
+            </a:extLst>
+          </p:cNvPr>
+          <p:cNvSpPr>
+            <a:spLocks noGrp="1"/>
+          </p:cNvSpPr>
+          <p:nvPr>
+            <p:ph type="title"/>
+          </p:nvPr>
+        </p:nvSpPr>
+        <p:spPr/>
+        <p:txBody>
+          <a:bodyPr/>
+          <a:lstStyle/>
+          <a:p>
+            <a:r>
+              <a:rPr lang="fr-FR" dirty="0"/>
+              <a:t>Immutabilité</a:t>
+            </a:r>
+          </a:p>
+        </p:txBody>
+      </p:sp>
+      <p:sp>
+        <p:nvSpPr>
+          <p:cNvPr id="3" name="Espace réservé du contenu 2">
+            <a:extLst>
+              <a:ext uri="{FF2B5EF4-FFF2-40B4-BE49-F238E27FC236}">
+                <a16:creationId xmlns:a16="http://schemas.microsoft.com/office/drawing/2014/main" id="{526CE87E-D48F-C15C-1446-2314C0538431}"/>
+              </a:ext>
+            </a:extLst>
+          </p:cNvPr>
+          <p:cNvSpPr>
+            <a:spLocks noGrp="1"/>
+          </p:cNvSpPr>
+          <p:nvPr>
+            <p:ph idx="1"/>
+          </p:nvPr>
+        </p:nvSpPr>
+        <p:spPr/>
+        <p:txBody>
+          <a:bodyPr/>
+          <a:lstStyle/>
+          <a:p>
+            <a:pPr marL="0" indent="0">
+              <a:buNone/>
+            </a:pPr>
+            <a:r>
+              <a:rPr lang="fr-FR" dirty="0"/>
+              <a:t>Objet </a:t>
+            </a:r>
+            <a:r>
+              <a:rPr lang="fr-FR" b="1" dirty="0"/>
+              <a:t>dont l'état ne peut pas être modifié</a:t>
+            </a:r>
+            <a:r>
+              <a:rPr lang="fr-FR" dirty="0"/>
+              <a:t> une fois qu’il a été créé. Une classe immutable est beaucoup plus facile à comprendre qu’une classe mutable.</a:t>
+            </a:r>
+          </a:p>
+          <a:p>
+            <a:pPr marL="0" indent="0">
+              <a:buNone/>
+            </a:pPr>
+            <a:endParaRPr lang="fr-FR" dirty="0"/>
+          </a:p>
+        </p:txBody>
+      </p:sp>
+      <p:sp>
+        <p:nvSpPr>
+          <p:cNvPr id="4" name="ZoneTexte 3">
+            <a:extLst>
+              <a:ext uri="{FF2B5EF4-FFF2-40B4-BE49-F238E27FC236}">
+                <a16:creationId xmlns:a16="http://schemas.microsoft.com/office/drawing/2014/main" id="{E73287B1-D619-9B49-8798-B4764C91E646}"/>
+              </a:ext>
+            </a:extLst>
+          </p:cNvPr>
+          <p:cNvSpPr txBox="1"/>
+          <p:nvPr/>
+        </p:nvSpPr>
+        <p:spPr>
+          <a:xfrm>
+            <a:off x="10007466" y="365125"/>
+            <a:ext cx="1486369" cy="369332"/>
+          </a:xfrm>
+          <a:prstGeom prst="rect">
+            <a:avLst/>
+          </a:prstGeom>
+          <a:noFill/>
+        </p:spPr>
+        <p:txBody>
+          <a:bodyPr wrap="none" rtlCol="0">
+            <a:spAutoFit/>
+          </a:bodyPr>
+          <a:lstStyle/>
+          <a:p>
+            <a:r>
+              <a:rPr lang="fr-FR" i="1" dirty="0">
+                <a:solidFill>
+                  <a:schemeClr val="accent6"/>
+                </a:solidFill>
+              </a:rPr>
+              <a:t>#immutability</a:t>
+            </a:r>
+          </a:p>
+        </p:txBody>
+      </p:sp>
+      <p:graphicFrame>
+        <p:nvGraphicFramePr>
+          <p:cNvPr id="5" name="Tableau 4">
+            <a:extLst>
+              <a:ext uri="{FF2B5EF4-FFF2-40B4-BE49-F238E27FC236}">
+                <a16:creationId xmlns:a16="http://schemas.microsoft.com/office/drawing/2014/main" id="{CD721A97-C3DA-A7A1-2A18-951392167F76}"/>
+              </a:ext>
+            </a:extLst>
+          </p:cNvPr>
+          <p:cNvGraphicFramePr>
+            <a:graphicFrameLocks noGrp="1"/>
+          </p:cNvGraphicFramePr>
+          <p:nvPr>
+            <p:extLst>
+              <p:ext uri="{D42A27DB-BD31-4B8C-83A1-F6EECF244321}">
+                <p14:modId xmlns:p14="http://schemas.microsoft.com/office/powerpoint/2010/main" val="3688135592"/>
+              </p:ext>
+            </p:extLst>
+          </p:nvPr>
+        </p:nvGraphicFramePr>
+        <p:xfrm>
+          <a:off x="838200" y="3517905"/>
+          <a:ext cx="10515600" cy="2103120"/>
+        </p:xfrm>
+        <a:graphic>
+          <a:graphicData uri="http://schemas.openxmlformats.org/drawingml/2006/table">
+            <a:tbl>
+              <a:tblPr/>
+              <a:tblGrid>
+                <a:gridCol w="2103120">
+                  <a:extLst>
+                    <a:ext uri="{9D8B030D-6E8A-4147-A177-3AD203B41FA5}">
+                      <a16:colId xmlns:a16="http://schemas.microsoft.com/office/drawing/2014/main" val="4201685794"/>
+                    </a:ext>
+                  </a:extLst>
+                </a:gridCol>
+                <a:gridCol w="2103120">
+                  <a:extLst>
+                    <a:ext uri="{9D8B030D-6E8A-4147-A177-3AD203B41FA5}">
+                      <a16:colId xmlns:a16="http://schemas.microsoft.com/office/drawing/2014/main" val="1726324867"/>
+                    </a:ext>
+                  </a:extLst>
+                </a:gridCol>
+                <a:gridCol w="2103120">
+                  <a:extLst>
+                    <a:ext uri="{9D8B030D-6E8A-4147-A177-3AD203B41FA5}">
+                      <a16:colId xmlns:a16="http://schemas.microsoft.com/office/drawing/2014/main" val="3256139847"/>
+                    </a:ext>
+                  </a:extLst>
+                </a:gridCol>
+                <a:gridCol w="2103120">
+                  <a:extLst>
+                    <a:ext uri="{9D8B030D-6E8A-4147-A177-3AD203B41FA5}">
+                      <a16:colId xmlns:a16="http://schemas.microsoft.com/office/drawing/2014/main" val="958618281"/>
+                    </a:ext>
+                  </a:extLst>
+                </a:gridCol>
+                <a:gridCol w="2103120">
+                  <a:extLst>
+                    <a:ext uri="{9D8B030D-6E8A-4147-A177-3AD203B41FA5}">
+                      <a16:colId xmlns:a16="http://schemas.microsoft.com/office/drawing/2014/main" val="296493772"/>
+                    </a:ext>
+                  </a:extLst>
+                </a:gridCol>
+              </a:tblGrid>
+              <a:tr h="0">
+                <a:tc>
+                  <a:txBody>
+                    <a:bodyPr/>
+                    <a:lstStyle/>
+                    <a:p>
+                      <a:r>
+                        <a:rPr lang="fr-FR"/>
+                        <a:t>Méthode</a:t>
+                      </a:r>
+                    </a:p>
+                  </a:txBody>
+                  <a:tcPr anchor="ctr">
+                    <a:lnL>
+                      <a:noFill/>
+                    </a:lnL>
+                    <a:lnR>
+                      <a:noFill/>
+                    </a:lnR>
+                    <a:lnT>
+                      <a:noFill/>
+                    </a:lnT>
+                    <a:lnB>
+                      <a:noFill/>
+                    </a:lnB>
+                    <a:noFill/>
+                  </a:tcPr>
+                </a:tc>
+                <a:tc>
+                  <a:txBody>
+                    <a:bodyPr/>
+                    <a:lstStyle/>
+                    <a:p>
+                      <a:r>
+                        <a:rPr lang="fr-FR"/>
+                        <a:t>Type</a:t>
+                      </a:r>
+                    </a:p>
+                  </a:txBody>
+                  <a:tcPr anchor="ctr">
+                    <a:lnL>
+                      <a:noFill/>
+                    </a:lnL>
+                    <a:lnR>
+                      <a:noFill/>
+                    </a:lnR>
+                    <a:lnT>
+                      <a:noFill/>
+                    </a:lnT>
+                    <a:lnB>
+                      <a:noFill/>
+                    </a:lnB>
+                    <a:noFill/>
+                  </a:tcPr>
+                </a:tc>
+                <a:tc>
+                  <a:txBody>
+                    <a:bodyPr/>
+                    <a:lstStyle/>
+                    <a:p>
+                      <a:r>
+                        <a:rPr lang="fr-FR"/>
+                        <a:t>Clarté</a:t>
+                      </a:r>
+                    </a:p>
+                  </a:txBody>
+                  <a:tcPr anchor="ctr">
+                    <a:lnL>
+                      <a:noFill/>
+                    </a:lnL>
+                    <a:lnR>
+                      <a:noFill/>
+                    </a:lnR>
+                    <a:lnT>
+                      <a:noFill/>
+                    </a:lnT>
+                    <a:lnB>
+                      <a:noFill/>
+                    </a:lnB>
+                    <a:noFill/>
+                  </a:tcPr>
+                </a:tc>
+                <a:tc>
+                  <a:txBody>
+                    <a:bodyPr/>
+                    <a:lstStyle/>
+                    <a:p>
+                      <a:r>
+                        <a:rPr lang="fr-FR"/>
+                        <a:t>Performance</a:t>
+                      </a:r>
+                    </a:p>
+                  </a:txBody>
+                  <a:tcPr anchor="ctr">
+                    <a:lnL>
+                      <a:noFill/>
+                    </a:lnL>
+                    <a:lnR>
+                      <a:noFill/>
+                    </a:lnR>
+                    <a:lnT>
+                      <a:noFill/>
+                    </a:lnT>
+                    <a:lnB>
+                      <a:noFill/>
+                    </a:lnB>
+                    <a:noFill/>
+                  </a:tcPr>
+                </a:tc>
+                <a:tc>
+                  <a:txBody>
+                    <a:bodyPr/>
+                    <a:lstStyle/>
+                    <a:p>
+                      <a:r>
+                        <a:rPr lang="fr-FR"/>
+                        <a:t>Notes</a:t>
+                      </a:r>
+                    </a:p>
+                  </a:txBody>
+                  <a:tcPr anchor="ctr">
+                    <a:lnL>
+                      <a:noFill/>
+                    </a:lnL>
+                    <a:lnR>
+                      <a:noFill/>
+                    </a:lnR>
+                    <a:lnT>
+                      <a:noFill/>
+                    </a:lnT>
+                    <a:lnB>
+                      <a:noFill/>
+                    </a:lnB>
+                    <a:noFill/>
+                  </a:tcPr>
+                </a:tc>
+                <a:extLst>
+                  <a:ext uri="{0D108BD9-81ED-4DB2-BD59-A6C34878D82A}">
+                    <a16:rowId xmlns:a16="http://schemas.microsoft.com/office/drawing/2014/main" val="3012484552"/>
+                  </a:ext>
+                </a:extLst>
+              </a:tr>
+              <a:tr h="0">
+                <a:tc>
+                  <a:txBody>
+                    <a:bodyPr/>
+                    <a:lstStyle/>
+                    <a:p>
+                      <a:r>
+                        <a:rPr lang="fr-FR"/>
+                        <a:t>record</a:t>
+                      </a:r>
+                    </a:p>
+                  </a:txBody>
+                  <a:tcPr anchor="ctr">
+                    <a:lnL>
+                      <a:noFill/>
+                    </a:lnL>
+                    <a:lnR>
+                      <a:noFill/>
+                    </a:lnR>
+                    <a:lnT>
+                      <a:noFill/>
+                    </a:lnT>
+                    <a:lnB>
+                      <a:noFill/>
+                    </a:lnB>
+                    <a:noFill/>
+                  </a:tcPr>
+                </a:tc>
+                <a:tc>
+                  <a:txBody>
+                    <a:bodyPr/>
+                    <a:lstStyle/>
+                    <a:p>
+                      <a:r>
+                        <a:rPr lang="fr-FR"/>
+                        <a:t>Référence</a:t>
+                      </a:r>
+                    </a:p>
+                  </a:txBody>
+                  <a:tcPr anchor="ctr">
+                    <a:lnL>
+                      <a:noFill/>
+                    </a:lnL>
+                    <a:lnR>
+                      <a:noFill/>
+                    </a:lnR>
+                    <a:lnT>
+                      <a:noFill/>
+                    </a:lnT>
+                    <a:lnB>
+                      <a:noFill/>
+                    </a:lnB>
+                    <a:noFill/>
+                  </a:tcPr>
+                </a:tc>
+                <a:tc>
+                  <a:txBody>
+                    <a:bodyPr/>
+                    <a:lstStyle/>
+                    <a:p>
+                      <a:r>
+                        <a:rPr lang="fr-FR"/>
+                        <a:t>✅ Facile</a:t>
+                      </a:r>
+                    </a:p>
+                  </a:txBody>
+                  <a:tcPr anchor="ctr">
+                    <a:lnL>
+                      <a:noFill/>
+                    </a:lnL>
+                    <a:lnR>
+                      <a:noFill/>
+                    </a:lnR>
+                    <a:lnT>
+                      <a:noFill/>
+                    </a:lnT>
+                    <a:lnB>
+                      <a:noFill/>
+                    </a:lnB>
+                    <a:noFill/>
+                  </a:tcPr>
+                </a:tc>
+                <a:tc>
+                  <a:txBody>
+                    <a:bodyPr/>
+                    <a:lstStyle/>
+                    <a:p>
+                      <a:r>
+                        <a:rPr lang="fr-FR"/>
+                        <a:t>⚠️ Référence</a:t>
+                      </a:r>
+                    </a:p>
+                  </a:txBody>
+                  <a:tcPr anchor="ctr">
+                    <a:lnL>
+                      <a:noFill/>
+                    </a:lnL>
+                    <a:lnR>
+                      <a:noFill/>
+                    </a:lnR>
+                    <a:lnT>
+                      <a:noFill/>
+                    </a:lnT>
+                    <a:lnB>
+                      <a:noFill/>
+                    </a:lnB>
+                    <a:noFill/>
+                  </a:tcPr>
+                </a:tc>
+                <a:tc>
+                  <a:txBody>
+                    <a:bodyPr/>
+                    <a:lstStyle/>
+                    <a:p>
+                      <a:r>
+                        <a:rPr lang="fr-FR"/>
+                        <a:t>Meilleur choix général</a:t>
+                      </a:r>
+                    </a:p>
+                  </a:txBody>
+                  <a:tcPr anchor="ctr">
+                    <a:lnL>
+                      <a:noFill/>
+                    </a:lnL>
+                    <a:lnR>
+                      <a:noFill/>
+                    </a:lnR>
+                    <a:lnT>
+                      <a:noFill/>
+                    </a:lnT>
+                    <a:lnB>
+                      <a:noFill/>
+                    </a:lnB>
+                    <a:noFill/>
+                  </a:tcPr>
+                </a:tc>
+                <a:extLst>
+                  <a:ext uri="{0D108BD9-81ED-4DB2-BD59-A6C34878D82A}">
+                    <a16:rowId xmlns:a16="http://schemas.microsoft.com/office/drawing/2014/main" val="2141370419"/>
+                  </a:ext>
+                </a:extLst>
+              </a:tr>
+              <a:tr h="0">
+                <a:tc>
+                  <a:txBody>
+                    <a:bodyPr/>
+                    <a:lstStyle/>
+                    <a:p>
+                      <a:r>
+                        <a:rPr lang="fr-FR"/>
+                        <a:t>readonly struct</a:t>
+                      </a:r>
+                    </a:p>
+                  </a:txBody>
+                  <a:tcPr anchor="ctr">
+                    <a:lnL>
+                      <a:noFill/>
+                    </a:lnL>
+                    <a:lnR>
+                      <a:noFill/>
+                    </a:lnR>
+                    <a:lnT>
+                      <a:noFill/>
+                    </a:lnT>
+                    <a:lnB>
+                      <a:noFill/>
+                    </a:lnB>
+                    <a:noFill/>
+                  </a:tcPr>
+                </a:tc>
+                <a:tc>
+                  <a:txBody>
+                    <a:bodyPr/>
+                    <a:lstStyle/>
+                    <a:p>
+                      <a:r>
+                        <a:rPr lang="fr-FR"/>
+                        <a:t>Valeur</a:t>
+                      </a:r>
+                    </a:p>
+                  </a:txBody>
+                  <a:tcPr anchor="ctr">
+                    <a:lnL>
+                      <a:noFill/>
+                    </a:lnL>
+                    <a:lnR>
+                      <a:noFill/>
+                    </a:lnR>
+                    <a:lnT>
+                      <a:noFill/>
+                    </a:lnT>
+                    <a:lnB>
+                      <a:noFill/>
+                    </a:lnB>
+                    <a:noFill/>
+                  </a:tcPr>
+                </a:tc>
+                <a:tc>
+                  <a:txBody>
+                    <a:bodyPr/>
+                    <a:lstStyle/>
+                    <a:p>
+                      <a:r>
+                        <a:rPr lang="fr-FR"/>
+                        <a:t>✔️ Bon</a:t>
+                      </a:r>
+                    </a:p>
+                  </a:txBody>
+                  <a:tcPr anchor="ctr">
+                    <a:lnL>
+                      <a:noFill/>
+                    </a:lnL>
+                    <a:lnR>
+                      <a:noFill/>
+                    </a:lnR>
+                    <a:lnT>
+                      <a:noFill/>
+                    </a:lnT>
+                    <a:lnB>
+                      <a:noFill/>
+                    </a:lnB>
+                    <a:noFill/>
+                  </a:tcPr>
+                </a:tc>
+                <a:tc>
+                  <a:txBody>
+                    <a:bodyPr/>
+                    <a:lstStyle/>
+                    <a:p>
+                      <a:r>
+                        <a:rPr lang="fr-FR"/>
+                        <a:t>✅ Léger</a:t>
+                      </a:r>
+                    </a:p>
+                  </a:txBody>
+                  <a:tcPr anchor="ctr">
+                    <a:lnL>
+                      <a:noFill/>
+                    </a:lnL>
+                    <a:lnR>
+                      <a:noFill/>
+                    </a:lnR>
+                    <a:lnT>
+                      <a:noFill/>
+                    </a:lnT>
+                    <a:lnB>
+                      <a:noFill/>
+                    </a:lnB>
+                    <a:noFill/>
+                  </a:tcPr>
+                </a:tc>
+                <a:tc>
+                  <a:txBody>
+                    <a:bodyPr/>
+                    <a:lstStyle/>
+                    <a:p>
+                      <a:r>
+                        <a:rPr lang="fr-FR"/>
+                        <a:t>Attention à la copie</a:t>
+                      </a:r>
+                    </a:p>
+                  </a:txBody>
+                  <a:tcPr anchor="ctr">
+                    <a:lnL>
+                      <a:noFill/>
+                    </a:lnL>
+                    <a:lnR>
+                      <a:noFill/>
+                    </a:lnR>
+                    <a:lnT>
+                      <a:noFill/>
+                    </a:lnT>
+                    <a:lnB>
+                      <a:noFill/>
+                    </a:lnB>
+                    <a:noFill/>
+                  </a:tcPr>
+                </a:tc>
+                <a:extLst>
+                  <a:ext uri="{0D108BD9-81ED-4DB2-BD59-A6C34878D82A}">
+                    <a16:rowId xmlns:a16="http://schemas.microsoft.com/office/drawing/2014/main" val="918038822"/>
+                  </a:ext>
+                </a:extLst>
+              </a:tr>
+              <a:tr h="0">
+                <a:tc>
+                  <a:txBody>
+                    <a:bodyPr/>
+                    <a:lstStyle/>
+                    <a:p>
+                      <a:r>
+                        <a:rPr lang="fr-FR"/>
+                        <a:t>Classe avec init</a:t>
+                      </a:r>
+                    </a:p>
+                  </a:txBody>
+                  <a:tcPr anchor="ctr">
+                    <a:lnL>
+                      <a:noFill/>
+                    </a:lnL>
+                    <a:lnR>
+                      <a:noFill/>
+                    </a:lnR>
+                    <a:lnT>
+                      <a:noFill/>
+                    </a:lnT>
+                    <a:lnB>
+                      <a:noFill/>
+                    </a:lnB>
+                    <a:noFill/>
+                  </a:tcPr>
+                </a:tc>
+                <a:tc>
+                  <a:txBody>
+                    <a:bodyPr/>
+                    <a:lstStyle/>
+                    <a:p>
+                      <a:r>
+                        <a:rPr lang="fr-FR"/>
+                        <a:t>Référence</a:t>
+                      </a:r>
+                    </a:p>
+                  </a:txBody>
+                  <a:tcPr anchor="ctr">
+                    <a:lnL>
+                      <a:noFill/>
+                    </a:lnL>
+                    <a:lnR>
+                      <a:noFill/>
+                    </a:lnR>
+                    <a:lnT>
+                      <a:noFill/>
+                    </a:lnT>
+                    <a:lnB>
+                      <a:noFill/>
+                    </a:lnB>
+                    <a:noFill/>
+                  </a:tcPr>
+                </a:tc>
+                <a:tc>
+                  <a:txBody>
+                    <a:bodyPr/>
+                    <a:lstStyle/>
+                    <a:p>
+                      <a:r>
+                        <a:rPr lang="fr-FR"/>
+                        <a:t>✔️ Moyen</a:t>
+                      </a:r>
+                    </a:p>
+                  </a:txBody>
+                  <a:tcPr anchor="ctr">
+                    <a:lnL>
+                      <a:noFill/>
+                    </a:lnL>
+                    <a:lnR>
+                      <a:noFill/>
+                    </a:lnR>
+                    <a:lnT>
+                      <a:noFill/>
+                    </a:lnT>
+                    <a:lnB>
+                      <a:noFill/>
+                    </a:lnB>
+                    <a:noFill/>
+                  </a:tcPr>
+                </a:tc>
+                <a:tc>
+                  <a:txBody>
+                    <a:bodyPr/>
+                    <a:lstStyle/>
+                    <a:p>
+                      <a:r>
+                        <a:rPr lang="fr-FR"/>
+                        <a:t>✔️ Correct</a:t>
+                      </a:r>
+                    </a:p>
+                  </a:txBody>
+                  <a:tcPr anchor="ctr">
+                    <a:lnL>
+                      <a:noFill/>
+                    </a:lnL>
+                    <a:lnR>
+                      <a:noFill/>
+                    </a:lnR>
+                    <a:lnT>
+                      <a:noFill/>
+                    </a:lnT>
+                    <a:lnB>
+                      <a:noFill/>
+                    </a:lnB>
+                    <a:noFill/>
+                  </a:tcPr>
+                </a:tc>
+                <a:tc>
+                  <a:txBody>
+                    <a:bodyPr/>
+                    <a:lstStyle/>
+                    <a:p>
+                      <a:r>
+                        <a:rPr lang="fr-FR"/>
+                        <a:t>Plus verbeux</a:t>
+                      </a:r>
+                    </a:p>
+                  </a:txBody>
+                  <a:tcPr anchor="ctr">
+                    <a:lnL>
+                      <a:noFill/>
+                    </a:lnL>
+                    <a:lnR>
+                      <a:noFill/>
+                    </a:lnR>
+                    <a:lnT>
+                      <a:noFill/>
+                    </a:lnT>
+                    <a:lnB>
+                      <a:noFill/>
+                    </a:lnB>
+                    <a:noFill/>
+                  </a:tcPr>
+                </a:tc>
+                <a:extLst>
+                  <a:ext uri="{0D108BD9-81ED-4DB2-BD59-A6C34878D82A}">
+                    <a16:rowId xmlns:a16="http://schemas.microsoft.com/office/drawing/2014/main" val="4045458916"/>
+                  </a:ext>
+                </a:extLst>
+              </a:tr>
+              <a:tr h="0">
+                <a:tc>
+                  <a:txBody>
+                    <a:bodyPr/>
+                    <a:lstStyle/>
+                    <a:p>
+                      <a:r>
+                        <a:rPr lang="fr-FR"/>
+                        <a:t>Classe avec get only</a:t>
+                      </a:r>
+                    </a:p>
+                  </a:txBody>
+                  <a:tcPr anchor="ctr">
+                    <a:lnL>
+                      <a:noFill/>
+                    </a:lnL>
+                    <a:lnR>
+                      <a:noFill/>
+                    </a:lnR>
+                    <a:lnT>
+                      <a:noFill/>
+                    </a:lnT>
+                    <a:lnB>
+                      <a:noFill/>
+                    </a:lnB>
+                    <a:noFill/>
+                  </a:tcPr>
+                </a:tc>
+                <a:tc>
+                  <a:txBody>
+                    <a:bodyPr/>
+                    <a:lstStyle/>
+                    <a:p>
+                      <a:r>
+                        <a:rPr lang="fr-FR"/>
+                        <a:t>Référence</a:t>
+                      </a:r>
+                    </a:p>
+                  </a:txBody>
+                  <a:tcPr anchor="ctr">
+                    <a:lnL>
+                      <a:noFill/>
+                    </a:lnL>
+                    <a:lnR>
+                      <a:noFill/>
+                    </a:lnR>
+                    <a:lnT>
+                      <a:noFill/>
+                    </a:lnT>
+                    <a:lnB>
+                      <a:noFill/>
+                    </a:lnB>
+                    <a:noFill/>
+                  </a:tcPr>
+                </a:tc>
+                <a:tc>
+                  <a:txBody>
+                    <a:bodyPr/>
+                    <a:lstStyle/>
+                    <a:p>
+                      <a:r>
+                        <a:rPr lang="fr-FR"/>
+                        <a:t>✔️ Moyen</a:t>
+                      </a:r>
+                    </a:p>
+                  </a:txBody>
+                  <a:tcPr anchor="ctr">
+                    <a:lnL>
+                      <a:noFill/>
+                    </a:lnL>
+                    <a:lnR>
+                      <a:noFill/>
+                    </a:lnR>
+                    <a:lnT>
+                      <a:noFill/>
+                    </a:lnT>
+                    <a:lnB>
+                      <a:noFill/>
+                    </a:lnB>
+                    <a:noFill/>
+                  </a:tcPr>
+                </a:tc>
+                <a:tc>
+                  <a:txBody>
+                    <a:bodyPr/>
+                    <a:lstStyle/>
+                    <a:p>
+                      <a:r>
+                        <a:rPr lang="fr-FR"/>
+                        <a:t>✔️ Correct</a:t>
+                      </a:r>
+                    </a:p>
+                  </a:txBody>
+                  <a:tcPr anchor="ctr">
+                    <a:lnL>
+                      <a:noFill/>
+                    </a:lnL>
+                    <a:lnR>
+                      <a:noFill/>
+                    </a:lnR>
+                    <a:lnT>
+                      <a:noFill/>
+                    </a:lnT>
+                    <a:lnB>
+                      <a:noFill/>
+                    </a:lnB>
+                    <a:noFill/>
+                  </a:tcPr>
+                </a:tc>
+                <a:tc>
+                  <a:txBody>
+                    <a:bodyPr/>
+                    <a:lstStyle/>
+                    <a:p>
+                      <a:r>
+                        <a:rPr lang="fr-FR" dirty="0"/>
+                        <a:t>Bon compromis</a:t>
+                      </a:r>
+                    </a:p>
+                  </a:txBody>
+                  <a:tcPr anchor="ctr">
+                    <a:lnL>
+                      <a:noFill/>
+                    </a:lnL>
+                    <a:lnR>
+                      <a:noFill/>
+                    </a:lnR>
+                    <a:lnT>
+                      <a:noFill/>
+                    </a:lnT>
+                    <a:lnB>
+                      <a:noFill/>
+                    </a:lnB>
+                    <a:noFill/>
+                  </a:tcPr>
+                </a:tc>
+                <a:extLst>
+                  <a:ext uri="{0D108BD9-81ED-4DB2-BD59-A6C34878D82A}">
+                    <a16:rowId xmlns:a16="http://schemas.microsoft.com/office/drawing/2014/main" val="2906377139"/>
+                  </a:ext>
+                </a:extLst>
+              </a:tr>
+            </a:tbl>
+          </a:graphicData>
+        </a:graphic>
+      </p:graphicFrame>
+    </p:spTree>
+    <p:extLst>
+      <p:ext uri="{BB962C8B-B14F-4D97-AF65-F5344CB8AC3E}">
+        <p14:creationId xmlns:p14="http://schemas.microsoft.com/office/powerpoint/2010/main" val="1035940884"/>
       </p:ext>
     </p:extLst>
   </p:cSld>

</xml_diff>